<commit_message>
Create .jar file and The End :)
</commit_message>
<xml_diff>
--- a/Presentation/FallingEggs.pptx
+++ b/Presentation/FallingEggs.pptx
@@ -4,6 +4,9 @@
   <p:sldMasterIdLst>
     <p:sldMasterId id="2147483753" r:id="rId1"/>
   </p:sldMasterIdLst>
+  <p:notesMasterIdLst>
+    <p:notesMasterId r:id="rId6"/>
+  </p:notesMasterIdLst>
   <p:sldIdLst>
     <p:sldId id="256" r:id="rId2"/>
     <p:sldId id="257" r:id="rId3"/>
@@ -113,6 +116,439 @@
     </p:ext>
   </p:extLst>
 </p:presentation>
+</file>
+
+<file path=ppt/notesMasters/notesMaster1.xml><?xml version="1.0" encoding="utf-8"?>
+<p:notesMaster xmlns:a="http://schemas.openxmlformats.org/drawingml/2006/main" xmlns:r="http://schemas.openxmlformats.org/officeDocument/2006/relationships" xmlns:p="http://schemas.openxmlformats.org/presentationml/2006/main">
+  <p:cSld>
+    <p:bg>
+      <p:bgRef idx="1001">
+        <a:schemeClr val="bg1"/>
+      </p:bgRef>
+    </p:bg>
+    <p:spTree>
+      <p:nvGrpSpPr>
+        <p:cNvPr id="1" name=""/>
+        <p:cNvGrpSpPr/>
+        <p:nvPr/>
+      </p:nvGrpSpPr>
+      <p:grpSpPr>
+        <a:xfrm>
+          <a:off x="0" y="0"/>
+          <a:ext cx="0" cy="0"/>
+          <a:chOff x="0" y="0"/>
+          <a:chExt cx="0" cy="0"/>
+        </a:xfrm>
+      </p:grpSpPr>
+      <p:sp>
+        <p:nvSpPr>
+          <p:cNvPr id="2" name="Контейнер за горния колонтитул 1"/>
+          <p:cNvSpPr>
+            <a:spLocks noGrp="1"/>
+          </p:cNvSpPr>
+          <p:nvPr>
+            <p:ph type="hdr" sz="quarter"/>
+          </p:nvPr>
+        </p:nvSpPr>
+        <p:spPr>
+          <a:xfrm>
+            <a:off x="0" y="0"/>
+            <a:ext cx="2971800" cy="458788"/>
+          </a:xfrm>
+          <a:prstGeom prst="rect">
+            <a:avLst/>
+          </a:prstGeom>
+        </p:spPr>
+        <p:txBody>
+          <a:bodyPr vert="horz" lIns="91440" tIns="45720" rIns="91440" bIns="45720" rtlCol="0"/>
+          <a:lstStyle>
+            <a:lvl1pPr algn="l">
+              <a:defRPr sz="1200"/>
+            </a:lvl1pPr>
+          </a:lstStyle>
+          <a:p>
+            <a:endParaRPr lang="bg-BG"/>
+          </a:p>
+        </p:txBody>
+      </p:sp>
+      <p:sp>
+        <p:nvSpPr>
+          <p:cNvPr id="3" name="Контейнер за дата 2"/>
+          <p:cNvSpPr>
+            <a:spLocks noGrp="1"/>
+          </p:cNvSpPr>
+          <p:nvPr>
+            <p:ph type="dt" idx="1"/>
+          </p:nvPr>
+        </p:nvSpPr>
+        <p:spPr>
+          <a:xfrm>
+            <a:off x="3884613" y="0"/>
+            <a:ext cx="2971800" cy="458788"/>
+          </a:xfrm>
+          <a:prstGeom prst="rect">
+            <a:avLst/>
+          </a:prstGeom>
+        </p:spPr>
+        <p:txBody>
+          <a:bodyPr vert="horz" lIns="91440" tIns="45720" rIns="91440" bIns="45720" rtlCol="0"/>
+          <a:lstStyle>
+            <a:lvl1pPr algn="r">
+              <a:defRPr sz="1200"/>
+            </a:lvl1pPr>
+          </a:lstStyle>
+          <a:p>
+            <a:fld id="{52935188-E970-4360-8357-366519D1064F}" type="datetimeFigureOut">
+              <a:rPr lang="bg-BG"/>
+              <a:t>20.4.2016 г.</a:t>
+            </a:fld>
+            <a:endParaRPr lang="bg-BG"/>
+          </a:p>
+        </p:txBody>
+      </p:sp>
+      <p:sp>
+        <p:nvSpPr>
+          <p:cNvPr id="4" name="Контейнер за изображение на слайда 3"/>
+          <p:cNvSpPr>
+            <a:spLocks noGrp="1" noRot="1" noChangeAspect="1"/>
+          </p:cNvSpPr>
+          <p:nvPr>
+            <p:ph type="sldImg" idx="2"/>
+          </p:nvPr>
+        </p:nvSpPr>
+        <p:spPr>
+          <a:xfrm>
+            <a:off x="685800" y="1143000"/>
+            <a:ext cx="5486400" cy="3086100"/>
+          </a:xfrm>
+          <a:prstGeom prst="rect">
+            <a:avLst/>
+          </a:prstGeom>
+          <a:noFill/>
+          <a:ln w="12700">
+            <a:solidFill>
+              <a:prstClr val="black"/>
+            </a:solidFill>
+          </a:ln>
+        </p:spPr>
+        <p:txBody>
+          <a:bodyPr vert="horz" lIns="91440" tIns="45720" rIns="91440" bIns="45720" rtlCol="0" anchor="ctr"/>
+          <a:lstStyle/>
+          <a:p>
+            <a:endParaRPr lang="bg-BG"/>
+          </a:p>
+        </p:txBody>
+      </p:sp>
+      <p:sp>
+        <p:nvSpPr>
+          <p:cNvPr id="5" name="Контейнер за бележки 4"/>
+          <p:cNvSpPr>
+            <a:spLocks noGrp="1"/>
+          </p:cNvSpPr>
+          <p:nvPr>
+            <p:ph type="body" sz="quarter" idx="3"/>
+          </p:nvPr>
+        </p:nvSpPr>
+        <p:spPr>
+          <a:xfrm>
+            <a:off x="685800" y="4400550"/>
+            <a:ext cx="5486400" cy="3600450"/>
+          </a:xfrm>
+          <a:prstGeom prst="rect">
+            <a:avLst/>
+          </a:prstGeom>
+        </p:spPr>
+        <p:txBody>
+          <a:bodyPr vert="horz" lIns="91440" tIns="45720" rIns="91440" bIns="45720" rtlCol="0"/>
+          <a:lstStyle/>
+          <a:p>
+            <a:pPr lvl="0"/>
+            <a:r>
+              <a:rPr lang="bg-BG"/>
+              <a:t>Редактиране на стиловете на текста в образеца</a:t>
+            </a:r>
+          </a:p>
+          <a:p>
+            <a:pPr lvl="1"/>
+            <a:r>
+              <a:rPr lang="bg-BG"/>
+              <a:t>Второ ниво</a:t>
+            </a:r>
+          </a:p>
+          <a:p>
+            <a:pPr lvl="2"/>
+            <a:r>
+              <a:rPr lang="bg-BG"/>
+              <a:t>Трето ниво</a:t>
+            </a:r>
+          </a:p>
+          <a:p>
+            <a:pPr lvl="3"/>
+            <a:r>
+              <a:rPr lang="bg-BG"/>
+              <a:t>Четвърто ниво</a:t>
+            </a:r>
+          </a:p>
+          <a:p>
+            <a:pPr lvl="4"/>
+            <a:r>
+              <a:rPr lang="bg-BG"/>
+              <a:t>Пето ниво</a:t>
+            </a:r>
+          </a:p>
+        </p:txBody>
+      </p:sp>
+      <p:sp>
+        <p:nvSpPr>
+          <p:cNvPr id="6" name="Контейнер за долния колонтитул 5"/>
+          <p:cNvSpPr>
+            <a:spLocks noGrp="1"/>
+          </p:cNvSpPr>
+          <p:nvPr>
+            <p:ph type="ftr" sz="quarter" idx="4"/>
+          </p:nvPr>
+        </p:nvSpPr>
+        <p:spPr>
+          <a:xfrm>
+            <a:off x="0" y="8685213"/>
+            <a:ext cx="2971800" cy="458787"/>
+          </a:xfrm>
+          <a:prstGeom prst="rect">
+            <a:avLst/>
+          </a:prstGeom>
+        </p:spPr>
+        <p:txBody>
+          <a:bodyPr vert="horz" lIns="91440" tIns="45720" rIns="91440" bIns="45720" rtlCol="0" anchor="b"/>
+          <a:lstStyle>
+            <a:lvl1pPr algn="l">
+              <a:defRPr sz="1200"/>
+            </a:lvl1pPr>
+          </a:lstStyle>
+          <a:p>
+            <a:endParaRPr lang="bg-BG"/>
+          </a:p>
+        </p:txBody>
+      </p:sp>
+      <p:sp>
+        <p:nvSpPr>
+          <p:cNvPr id="7" name="Контейнер за номер на слайда 6"/>
+          <p:cNvSpPr>
+            <a:spLocks noGrp="1"/>
+          </p:cNvSpPr>
+          <p:nvPr>
+            <p:ph type="sldNum" sz="quarter" idx="5"/>
+          </p:nvPr>
+        </p:nvSpPr>
+        <p:spPr>
+          <a:xfrm>
+            <a:off x="3884613" y="8685213"/>
+            <a:ext cx="2971800" cy="458787"/>
+          </a:xfrm>
+          <a:prstGeom prst="rect">
+            <a:avLst/>
+          </a:prstGeom>
+        </p:spPr>
+        <p:txBody>
+          <a:bodyPr vert="horz" lIns="91440" tIns="45720" rIns="91440" bIns="45720" rtlCol="0" anchor="b"/>
+          <a:lstStyle>
+            <a:lvl1pPr algn="r">
+              <a:defRPr sz="1200"/>
+            </a:lvl1pPr>
+          </a:lstStyle>
+          <a:p>
+            <a:fld id="{41CEB6F2-AA18-46BB-B729-A6991417107B}" type="slidenum">
+              <a:rPr lang="bg-BG"/>
+              <a:t>‹#›</a:t>
+            </a:fld>
+            <a:endParaRPr lang="bg-BG"/>
+          </a:p>
+        </p:txBody>
+      </p:sp>
+    </p:spTree>
+    <p:extLst>
+      <p:ext uri="{BB962C8B-B14F-4D97-AF65-F5344CB8AC3E}">
+        <p14:creationId xmlns:p14="http://schemas.microsoft.com/office/powerpoint/2010/main" val="3517081463"/>
+      </p:ext>
+    </p:extLst>
+  </p:cSld>
+  <p:clrMap bg1="lt1" tx1="dk1" bg2="lt2" tx2="dk2" accent1="accent1" accent2="accent2" accent3="accent3" accent4="accent4" accent5="accent5" accent6="accent6" hlink="hlink" folHlink="folHlink"/>
+  <p:notesStyle>
+    <a:lvl1pPr marL="0" algn="l" defTabSz="914400" rtl="0" eaLnBrk="1" latinLnBrk="0" hangingPunct="1">
+      <a:defRPr sz="1200" kern="1200">
+        <a:solidFill>
+          <a:schemeClr val="tx1"/>
+        </a:solidFill>
+        <a:latin typeface="+mn-lt"/>
+        <a:ea typeface="+mn-ea"/>
+        <a:cs typeface="+mn-cs"/>
+      </a:defRPr>
+    </a:lvl1pPr>
+    <a:lvl2pPr marL="457200" algn="l" defTabSz="914400" rtl="0" eaLnBrk="1" latinLnBrk="0" hangingPunct="1">
+      <a:defRPr sz="1200" kern="1200">
+        <a:solidFill>
+          <a:schemeClr val="tx1"/>
+        </a:solidFill>
+        <a:latin typeface="+mn-lt"/>
+        <a:ea typeface="+mn-ea"/>
+        <a:cs typeface="+mn-cs"/>
+      </a:defRPr>
+    </a:lvl2pPr>
+    <a:lvl3pPr marL="914400" algn="l" defTabSz="914400" rtl="0" eaLnBrk="1" latinLnBrk="0" hangingPunct="1">
+      <a:defRPr sz="1200" kern="1200">
+        <a:solidFill>
+          <a:schemeClr val="tx1"/>
+        </a:solidFill>
+        <a:latin typeface="+mn-lt"/>
+        <a:ea typeface="+mn-ea"/>
+        <a:cs typeface="+mn-cs"/>
+      </a:defRPr>
+    </a:lvl3pPr>
+    <a:lvl4pPr marL="1371600" algn="l" defTabSz="914400" rtl="0" eaLnBrk="1" latinLnBrk="0" hangingPunct="1">
+      <a:defRPr sz="1200" kern="1200">
+        <a:solidFill>
+          <a:schemeClr val="tx1"/>
+        </a:solidFill>
+        <a:latin typeface="+mn-lt"/>
+        <a:ea typeface="+mn-ea"/>
+        <a:cs typeface="+mn-cs"/>
+      </a:defRPr>
+    </a:lvl4pPr>
+    <a:lvl5pPr marL="1828800" algn="l" defTabSz="914400" rtl="0" eaLnBrk="1" latinLnBrk="0" hangingPunct="1">
+      <a:defRPr sz="1200" kern="1200">
+        <a:solidFill>
+          <a:schemeClr val="tx1"/>
+        </a:solidFill>
+        <a:latin typeface="+mn-lt"/>
+        <a:ea typeface="+mn-ea"/>
+        <a:cs typeface="+mn-cs"/>
+      </a:defRPr>
+    </a:lvl5pPr>
+    <a:lvl6pPr marL="2286000" algn="l" defTabSz="914400" rtl="0" eaLnBrk="1" latinLnBrk="0" hangingPunct="1">
+      <a:defRPr sz="1200" kern="1200">
+        <a:solidFill>
+          <a:schemeClr val="tx1"/>
+        </a:solidFill>
+        <a:latin typeface="+mn-lt"/>
+        <a:ea typeface="+mn-ea"/>
+        <a:cs typeface="+mn-cs"/>
+      </a:defRPr>
+    </a:lvl6pPr>
+    <a:lvl7pPr marL="2743200" algn="l" defTabSz="914400" rtl="0" eaLnBrk="1" latinLnBrk="0" hangingPunct="1">
+      <a:defRPr sz="1200" kern="1200">
+        <a:solidFill>
+          <a:schemeClr val="tx1"/>
+        </a:solidFill>
+        <a:latin typeface="+mn-lt"/>
+        <a:ea typeface="+mn-ea"/>
+        <a:cs typeface="+mn-cs"/>
+      </a:defRPr>
+    </a:lvl7pPr>
+    <a:lvl8pPr marL="3200400" algn="l" defTabSz="914400" rtl="0" eaLnBrk="1" latinLnBrk="0" hangingPunct="1">
+      <a:defRPr sz="1200" kern="1200">
+        <a:solidFill>
+          <a:schemeClr val="tx1"/>
+        </a:solidFill>
+        <a:latin typeface="+mn-lt"/>
+        <a:ea typeface="+mn-ea"/>
+        <a:cs typeface="+mn-cs"/>
+      </a:defRPr>
+    </a:lvl8pPr>
+    <a:lvl9pPr marL="3657600" algn="l" defTabSz="914400" rtl="0" eaLnBrk="1" latinLnBrk="0" hangingPunct="1">
+      <a:defRPr sz="1200" kern="1200">
+        <a:solidFill>
+          <a:schemeClr val="tx1"/>
+        </a:solidFill>
+        <a:latin typeface="+mn-lt"/>
+        <a:ea typeface="+mn-ea"/>
+        <a:cs typeface="+mn-cs"/>
+      </a:defRPr>
+    </a:lvl9pPr>
+  </p:notesStyle>
+</p:notesMaster>
+</file>
+
+<file path=ppt/notesSlides/notesSlide1.xml><?xml version="1.0" encoding="utf-8"?>
+<p:notes xmlns:a="http://schemas.openxmlformats.org/drawingml/2006/main" xmlns:r="http://schemas.openxmlformats.org/officeDocument/2006/relationships" xmlns:p="http://schemas.openxmlformats.org/presentationml/2006/main">
+  <p:cSld>
+    <p:spTree>
+      <p:nvGrpSpPr>
+        <p:cNvPr id="1" name=""/>
+        <p:cNvGrpSpPr/>
+        <p:nvPr/>
+      </p:nvGrpSpPr>
+      <p:grpSpPr>
+        <a:xfrm>
+          <a:off x="0" y="0"/>
+          <a:ext cx="0" cy="0"/>
+          <a:chOff x="0" y="0"/>
+          <a:chExt cx="0" cy="0"/>
+        </a:xfrm>
+      </p:grpSpPr>
+      <p:sp>
+        <p:nvSpPr>
+          <p:cNvPr id="2" name="Контейнер за изображение на слайда 1"/>
+          <p:cNvSpPr>
+            <a:spLocks noGrp="1" noRot="1" noChangeAspect="1"/>
+          </p:cNvSpPr>
+          <p:nvPr>
+            <p:ph type="sldImg"/>
+          </p:nvPr>
+        </p:nvSpPr>
+        <p:spPr/>
+      </p:sp>
+      <p:sp>
+        <p:nvSpPr>
+          <p:cNvPr id="3" name="Контейнер за бележки 2"/>
+          <p:cNvSpPr>
+            <a:spLocks noGrp="1"/>
+          </p:cNvSpPr>
+          <p:nvPr>
+            <p:ph type="body" idx="1"/>
+          </p:nvPr>
+        </p:nvSpPr>
+        <p:spPr/>
+        <p:txBody>
+          <a:bodyPr/>
+          <a:lstStyle/>
+          <a:p>
+            <a:endParaRPr lang="bg-BG"/>
+          </a:p>
+        </p:txBody>
+      </p:sp>
+      <p:sp>
+        <p:nvSpPr>
+          <p:cNvPr id="4" name="Контейнер за номер на слайда 3"/>
+          <p:cNvSpPr>
+            <a:spLocks noGrp="1"/>
+          </p:cNvSpPr>
+          <p:nvPr>
+            <p:ph type="sldNum" sz="quarter" idx="10"/>
+          </p:nvPr>
+        </p:nvSpPr>
+        <p:spPr/>
+        <p:txBody>
+          <a:bodyPr/>
+          <a:lstStyle/>
+          <a:p>
+            <a:fld id="{41CEB6F2-AA18-46BB-B729-A6991417107B}" type="slidenum">
+              <a:rPr lang="bg-BG"/>
+              <a:t>3</a:t>
+            </a:fld>
+            <a:endParaRPr lang="bg-BG"/>
+          </a:p>
+        </p:txBody>
+      </p:sp>
+    </p:spTree>
+    <p:extLst>
+      <p:ext uri="{BB962C8B-B14F-4D97-AF65-F5344CB8AC3E}">
+        <p14:creationId xmlns:p14="http://schemas.microsoft.com/office/powerpoint/2010/main" val="408948241"/>
+      </p:ext>
+    </p:extLst>
+  </p:cSld>
+  <p:clrMapOvr>
+    <a:masterClrMapping/>
+  </p:clrMapOvr>
+</p:notes>
 </file>
 
 <file path=ppt/slideLayouts/slideLayout1.xml><?xml version="1.0" encoding="utf-8"?>
@@ -693,7 +1129,7 @@
           </a:lstStyle>
           <a:p>
             <a:r>
-              <a:rPr lang="en-US" smtClean="0"/>
+              <a:rPr lang="en-US"/>
               <a:t>Click to edit Master title style</a:t>
             </a:r>
             <a:endParaRPr lang="en-US" dirty="0"/>
@@ -813,7 +1249,7 @@
           </a:lstStyle>
           <a:p>
             <a:r>
-              <a:rPr lang="en-US" smtClean="0"/>
+              <a:rPr lang="en-US"/>
               <a:t>Click to edit Master subtitle style</a:t>
             </a:r>
             <a:endParaRPr lang="en-US" dirty="0"/>
@@ -837,7 +1273,7 @@
           <a:p>
             <a:fld id="{52535105-08D2-4AB8-9573-02532F4EA060}" type="datetimeFigureOut">
               <a:rPr lang="en-US" smtClean="0"/>
-              <a:t>4/19/2016</a:t>
+              <a:t>4/20/2016</a:t>
             </a:fld>
             <a:endParaRPr lang="en-US"/>
           </a:p>
@@ -942,7 +1378,7 @@
           </a:lstStyle>
           <a:p>
             <a:r>
-              <a:rPr lang="en-US" smtClean="0"/>
+              <a:rPr lang="en-US"/>
               <a:t>Click to edit Master title style</a:t>
             </a:r>
             <a:endParaRPr lang="en-US" dirty="0"/>
@@ -1065,7 +1501,7 @@
           <a:p>
             <a:pPr lvl="0"/>
             <a:r>
-              <a:rPr lang="en-US" smtClean="0"/>
+              <a:rPr lang="en-US"/>
               <a:t>Edit Master text styles</a:t>
             </a:r>
           </a:p>
@@ -1088,7 +1524,7 @@
           <a:p>
             <a:fld id="{52535105-08D2-4AB8-9573-02532F4EA060}" type="datetimeFigureOut">
               <a:rPr lang="en-US" smtClean="0"/>
-              <a:t>4/19/2016</a:t>
+              <a:t>4/20/2016</a:t>
             </a:fld>
             <a:endParaRPr lang="en-US"/>
           </a:p>
@@ -1193,7 +1629,7 @@
           </a:lstStyle>
           <a:p>
             <a:r>
-              <a:rPr lang="en-US" smtClean="0"/>
+              <a:rPr lang="en-US"/>
               <a:t>Click to edit Master title style</a:t>
             </a:r>
             <a:endParaRPr lang="en-US" dirty="0"/>
@@ -1257,7 +1693,7 @@
           <a:p>
             <a:pPr lvl="0"/>
             <a:r>
-              <a:rPr lang="en-US" smtClean="0"/>
+              <a:rPr lang="en-US"/>
               <a:t>Edit Master text styles</a:t>
             </a:r>
           </a:p>
@@ -1379,7 +1815,7 @@
           <a:p>
             <a:pPr lvl="0"/>
             <a:r>
-              <a:rPr lang="en-US" smtClean="0"/>
+              <a:rPr lang="en-US"/>
               <a:t>Edit Master text styles</a:t>
             </a:r>
           </a:p>
@@ -1402,7 +1838,7 @@
           <a:p>
             <a:fld id="{52535105-08D2-4AB8-9573-02532F4EA060}" type="datetimeFigureOut">
               <a:rPr lang="en-US" smtClean="0"/>
-              <a:t>4/19/2016</a:t>
+              <a:t>4/20/2016</a:t>
             </a:fld>
             <a:endParaRPr lang="en-US"/>
           </a:p>
@@ -1597,7 +2033,7 @@
           </a:lstStyle>
           <a:p>
             <a:r>
-              <a:rPr lang="en-US" smtClean="0"/>
+              <a:rPr lang="en-US"/>
               <a:t>Click to edit Master title style</a:t>
             </a:r>
             <a:endParaRPr lang="en-US" dirty="0"/>
@@ -1720,7 +2156,7 @@
           <a:p>
             <a:pPr lvl="0"/>
             <a:r>
-              <a:rPr lang="en-US" smtClean="0"/>
+              <a:rPr lang="en-US"/>
               <a:t>Edit Master text styles</a:t>
             </a:r>
           </a:p>
@@ -1743,7 +2179,7 @@
           <a:p>
             <a:fld id="{52535105-08D2-4AB8-9573-02532F4EA060}" type="datetimeFigureOut">
               <a:rPr lang="en-US" smtClean="0"/>
-              <a:t>4/19/2016</a:t>
+              <a:t>4/20/2016</a:t>
             </a:fld>
             <a:endParaRPr lang="en-US"/>
           </a:p>
@@ -1848,7 +2284,7 @@
           </a:lstStyle>
           <a:p>
             <a:r>
-              <a:rPr lang="en-US" smtClean="0"/>
+              <a:rPr lang="en-US"/>
               <a:t>Click to edit Master title style</a:t>
             </a:r>
             <a:endParaRPr lang="en-US" dirty="0"/>
@@ -1912,7 +2348,7 @@
           <a:p>
             <a:pPr lvl="0"/>
             <a:r>
-              <a:rPr lang="en-US" smtClean="0"/>
+              <a:rPr lang="en-US"/>
               <a:t>Edit Master text styles</a:t>
             </a:r>
           </a:p>
@@ -2034,7 +2470,7 @@
           <a:p>
             <a:pPr lvl="0"/>
             <a:r>
-              <a:rPr lang="en-US" smtClean="0"/>
+              <a:rPr lang="en-US"/>
               <a:t>Edit Master text styles</a:t>
             </a:r>
           </a:p>
@@ -2057,7 +2493,7 @@
           <a:p>
             <a:fld id="{52535105-08D2-4AB8-9573-02532F4EA060}" type="datetimeFigureOut">
               <a:rPr lang="en-US" smtClean="0"/>
-              <a:t>4/19/2016</a:t>
+              <a:t>4/20/2016</a:t>
             </a:fld>
             <a:endParaRPr lang="en-US"/>
           </a:p>
@@ -2244,7 +2680,7 @@
           </a:lstStyle>
           <a:p>
             <a:r>
-              <a:rPr lang="en-US" smtClean="0"/>
+              <a:rPr lang="en-US"/>
               <a:t>Click to edit Master title style</a:t>
             </a:r>
             <a:endParaRPr lang="en-US" dirty="0"/>
@@ -2305,7 +2741,7 @@
           <a:p>
             <a:pPr lvl="0"/>
             <a:r>
-              <a:rPr lang="en-US" smtClean="0"/>
+              <a:rPr lang="en-US"/>
               <a:t>Edit Master text styles</a:t>
             </a:r>
           </a:p>
@@ -2427,7 +2863,7 @@
           <a:p>
             <a:pPr lvl="0"/>
             <a:r>
-              <a:rPr lang="en-US" smtClean="0"/>
+              <a:rPr lang="en-US"/>
               <a:t>Edit Master text styles</a:t>
             </a:r>
           </a:p>
@@ -2450,7 +2886,7 @@
           <a:p>
             <a:fld id="{52535105-08D2-4AB8-9573-02532F4EA060}" type="datetimeFigureOut">
               <a:rPr lang="en-US" smtClean="0"/>
-              <a:t>4/19/2016</a:t>
+              <a:t>4/20/2016</a:t>
             </a:fld>
             <a:endParaRPr lang="en-US"/>
           </a:p>
@@ -2544,7 +2980,7 @@
           <a:lstStyle/>
           <a:p>
             <a:r>
-              <a:rPr lang="en-US" smtClean="0"/>
+              <a:rPr lang="en-US"/>
               <a:t>Click to edit Master title style</a:t>
             </a:r>
             <a:endParaRPr lang="en-US" dirty="0"/>
@@ -2568,35 +3004,35 @@
           <a:p>
             <a:pPr lvl="0"/>
             <a:r>
-              <a:rPr lang="en-US" smtClean="0"/>
+              <a:rPr lang="en-US"/>
               <a:t>Edit Master text styles</a:t>
             </a:r>
           </a:p>
           <a:p>
             <a:pPr lvl="1"/>
             <a:r>
-              <a:rPr lang="en-US" smtClean="0"/>
+              <a:rPr lang="en-US"/>
               <a:t>Second level</a:t>
             </a:r>
           </a:p>
           <a:p>
             <a:pPr lvl="2"/>
             <a:r>
-              <a:rPr lang="en-US" smtClean="0"/>
+              <a:rPr lang="en-US"/>
               <a:t>Third level</a:t>
             </a:r>
           </a:p>
           <a:p>
             <a:pPr lvl="3"/>
             <a:r>
-              <a:rPr lang="en-US" smtClean="0"/>
+              <a:rPr lang="en-US"/>
               <a:t>Fourth level</a:t>
             </a:r>
           </a:p>
           <a:p>
             <a:pPr lvl="4"/>
             <a:r>
-              <a:rPr lang="en-US" smtClean="0"/>
+              <a:rPr lang="en-US"/>
               <a:t>Fifth level</a:t>
             </a:r>
             <a:endParaRPr lang="en-US" dirty="0"/>
@@ -2620,7 +3056,7 @@
           <a:p>
             <a:fld id="{52535105-08D2-4AB8-9573-02532F4EA060}" type="datetimeFigureOut">
               <a:rPr lang="en-US" smtClean="0"/>
-              <a:t>4/19/2016</a:t>
+              <a:t>4/20/2016</a:t>
             </a:fld>
             <a:endParaRPr lang="en-US"/>
           </a:p>
@@ -2719,7 +3155,7 @@
           <a:lstStyle/>
           <a:p>
             <a:r>
-              <a:rPr lang="en-US" smtClean="0"/>
+              <a:rPr lang="en-US"/>
               <a:t>Click to edit Master title style</a:t>
             </a:r>
             <a:endParaRPr lang="en-US" dirty="0"/>
@@ -2748,35 +3184,35 @@
           <a:p>
             <a:pPr lvl="0"/>
             <a:r>
-              <a:rPr lang="en-US" smtClean="0"/>
+              <a:rPr lang="en-US"/>
               <a:t>Edit Master text styles</a:t>
             </a:r>
           </a:p>
           <a:p>
             <a:pPr lvl="1"/>
             <a:r>
-              <a:rPr lang="en-US" smtClean="0"/>
+              <a:rPr lang="en-US"/>
               <a:t>Second level</a:t>
             </a:r>
           </a:p>
           <a:p>
             <a:pPr lvl="2"/>
             <a:r>
-              <a:rPr lang="en-US" smtClean="0"/>
+              <a:rPr lang="en-US"/>
               <a:t>Third level</a:t>
             </a:r>
           </a:p>
           <a:p>
             <a:pPr lvl="3"/>
             <a:r>
-              <a:rPr lang="en-US" smtClean="0"/>
+              <a:rPr lang="en-US"/>
               <a:t>Fourth level</a:t>
             </a:r>
           </a:p>
           <a:p>
             <a:pPr lvl="4"/>
             <a:r>
-              <a:rPr lang="en-US" smtClean="0"/>
+              <a:rPr lang="en-US"/>
               <a:t>Fifth level</a:t>
             </a:r>
             <a:endParaRPr lang="en-US" dirty="0"/>
@@ -2800,7 +3236,7 @@
           <a:p>
             <a:fld id="{52535105-08D2-4AB8-9573-02532F4EA060}" type="datetimeFigureOut">
               <a:rPr lang="en-US" smtClean="0"/>
-              <a:t>4/19/2016</a:t>
+              <a:t>4/20/2016</a:t>
             </a:fld>
             <a:endParaRPr lang="en-US"/>
           </a:p>
@@ -2900,7 +3336,7 @@
           </a:lstStyle>
           <a:p>
             <a:r>
-              <a:rPr lang="en-US" smtClean="0"/>
+              <a:rPr lang="en-US"/>
               <a:t>Click to edit Master title style</a:t>
             </a:r>
             <a:endParaRPr lang="en-US" dirty="0"/>
@@ -2924,35 +3360,35 @@
           <a:p>
             <a:pPr lvl="0"/>
             <a:r>
-              <a:rPr lang="en-US" smtClean="0"/>
+              <a:rPr lang="en-US"/>
               <a:t>Edit Master text styles</a:t>
             </a:r>
           </a:p>
           <a:p>
             <a:pPr lvl="1"/>
             <a:r>
-              <a:rPr lang="en-US" smtClean="0"/>
+              <a:rPr lang="en-US"/>
               <a:t>Second level</a:t>
             </a:r>
           </a:p>
           <a:p>
             <a:pPr lvl="2"/>
             <a:r>
-              <a:rPr lang="en-US" smtClean="0"/>
+              <a:rPr lang="en-US"/>
               <a:t>Third level</a:t>
             </a:r>
           </a:p>
           <a:p>
             <a:pPr lvl="3"/>
             <a:r>
-              <a:rPr lang="en-US" smtClean="0"/>
+              <a:rPr lang="en-US"/>
               <a:t>Fourth level</a:t>
             </a:r>
           </a:p>
           <a:p>
             <a:pPr lvl="4"/>
             <a:r>
-              <a:rPr lang="en-US" smtClean="0"/>
+              <a:rPr lang="en-US"/>
               <a:t>Fifth level</a:t>
             </a:r>
             <a:endParaRPr lang="en-US" dirty="0"/>
@@ -2976,7 +3412,7 @@
           <a:p>
             <a:fld id="{52535105-08D2-4AB8-9573-02532F4EA060}" type="datetimeFigureOut">
               <a:rPr lang="en-US" smtClean="0"/>
-              <a:t>4/19/2016</a:t>
+              <a:t>4/20/2016</a:t>
             </a:fld>
             <a:endParaRPr lang="en-US"/>
           </a:p>
@@ -3079,7 +3515,7 @@
           </a:lstStyle>
           <a:p>
             <a:r>
-              <a:rPr lang="en-US" smtClean="0"/>
+              <a:rPr lang="en-US"/>
               <a:t>Click to edit Master title style</a:t>
             </a:r>
             <a:endParaRPr lang="en-US" dirty="0"/>
@@ -3200,7 +3636,7 @@
           <a:p>
             <a:pPr lvl="0"/>
             <a:r>
-              <a:rPr lang="en-US" smtClean="0"/>
+              <a:rPr lang="en-US"/>
               <a:t>Edit Master text styles</a:t>
             </a:r>
           </a:p>
@@ -3223,7 +3659,7 @@
           <a:p>
             <a:fld id="{52535105-08D2-4AB8-9573-02532F4EA060}" type="datetimeFigureOut">
               <a:rPr lang="en-US" smtClean="0"/>
-              <a:t>4/19/2016</a:t>
+              <a:t>4/20/2016</a:t>
             </a:fld>
             <a:endParaRPr lang="en-US"/>
           </a:p>
@@ -3317,7 +3753,7 @@
           <a:lstStyle/>
           <a:p>
             <a:r>
-              <a:rPr lang="en-US" smtClean="0"/>
+              <a:rPr lang="en-US"/>
               <a:t>Click to edit Master title style</a:t>
             </a:r>
             <a:endParaRPr lang="en-US" dirty="0"/>
@@ -3346,35 +3782,35 @@
           <a:p>
             <a:pPr lvl="0"/>
             <a:r>
-              <a:rPr lang="en-US" smtClean="0"/>
+              <a:rPr lang="en-US"/>
               <a:t>Edit Master text styles</a:t>
             </a:r>
           </a:p>
           <a:p>
             <a:pPr lvl="1"/>
             <a:r>
-              <a:rPr lang="en-US" smtClean="0"/>
+              <a:rPr lang="en-US"/>
               <a:t>Second level</a:t>
             </a:r>
           </a:p>
           <a:p>
             <a:pPr lvl="2"/>
             <a:r>
-              <a:rPr lang="en-US" smtClean="0"/>
+              <a:rPr lang="en-US"/>
               <a:t>Third level</a:t>
             </a:r>
           </a:p>
           <a:p>
             <a:pPr lvl="3"/>
             <a:r>
-              <a:rPr lang="en-US" smtClean="0"/>
+              <a:rPr lang="en-US"/>
               <a:t>Fourth level</a:t>
             </a:r>
           </a:p>
           <a:p>
             <a:pPr lvl="4"/>
             <a:r>
-              <a:rPr lang="en-US" smtClean="0"/>
+              <a:rPr lang="en-US"/>
               <a:t>Fifth level</a:t>
             </a:r>
             <a:endParaRPr lang="en-US" dirty="0"/>
@@ -3403,35 +3839,35 @@
           <a:p>
             <a:pPr lvl="0"/>
             <a:r>
-              <a:rPr lang="en-US" smtClean="0"/>
+              <a:rPr lang="en-US"/>
               <a:t>Edit Master text styles</a:t>
             </a:r>
           </a:p>
           <a:p>
             <a:pPr lvl="1"/>
             <a:r>
-              <a:rPr lang="en-US" smtClean="0"/>
+              <a:rPr lang="en-US"/>
               <a:t>Second level</a:t>
             </a:r>
           </a:p>
           <a:p>
             <a:pPr lvl="2"/>
             <a:r>
-              <a:rPr lang="en-US" smtClean="0"/>
+              <a:rPr lang="en-US"/>
               <a:t>Third level</a:t>
             </a:r>
           </a:p>
           <a:p>
             <a:pPr lvl="3"/>
             <a:r>
-              <a:rPr lang="en-US" smtClean="0"/>
+              <a:rPr lang="en-US"/>
               <a:t>Fourth level</a:t>
             </a:r>
           </a:p>
           <a:p>
             <a:pPr lvl="4"/>
             <a:r>
-              <a:rPr lang="en-US" smtClean="0"/>
+              <a:rPr lang="en-US"/>
               <a:t>Fifth level</a:t>
             </a:r>
             <a:endParaRPr lang="en-US" dirty="0"/>
@@ -3455,7 +3891,7 @@
           <a:p>
             <a:fld id="{52535105-08D2-4AB8-9573-02532F4EA060}" type="datetimeFigureOut">
               <a:rPr lang="en-US" smtClean="0"/>
-              <a:t>4/19/2016</a:t>
+              <a:t>4/20/2016</a:t>
             </a:fld>
             <a:endParaRPr lang="en-US"/>
           </a:p>
@@ -3553,7 +3989,7 @@
           </a:lstStyle>
           <a:p>
             <a:r>
-              <a:rPr lang="en-US" smtClean="0"/>
+              <a:rPr lang="en-US"/>
               <a:t>Click to edit Master title style</a:t>
             </a:r>
             <a:endParaRPr lang="en-US" dirty="0"/>
@@ -3621,7 +4057,7 @@
           <a:p>
             <a:pPr lvl="0"/>
             <a:r>
-              <a:rPr lang="en-US" smtClean="0"/>
+              <a:rPr lang="en-US"/>
               <a:t>Edit Master text styles</a:t>
             </a:r>
           </a:p>
@@ -3651,35 +4087,35 @@
           <a:p>
             <a:pPr lvl="0"/>
             <a:r>
-              <a:rPr lang="en-US" smtClean="0"/>
+              <a:rPr lang="en-US"/>
               <a:t>Edit Master text styles</a:t>
             </a:r>
           </a:p>
           <a:p>
             <a:pPr lvl="1"/>
             <a:r>
-              <a:rPr lang="en-US" smtClean="0"/>
+              <a:rPr lang="en-US"/>
               <a:t>Second level</a:t>
             </a:r>
           </a:p>
           <a:p>
             <a:pPr lvl="2"/>
             <a:r>
-              <a:rPr lang="en-US" smtClean="0"/>
+              <a:rPr lang="en-US"/>
               <a:t>Third level</a:t>
             </a:r>
           </a:p>
           <a:p>
             <a:pPr lvl="3"/>
             <a:r>
-              <a:rPr lang="en-US" smtClean="0"/>
+              <a:rPr lang="en-US"/>
               <a:t>Fourth level</a:t>
             </a:r>
           </a:p>
           <a:p>
             <a:pPr lvl="4"/>
             <a:r>
-              <a:rPr lang="en-US" smtClean="0"/>
+              <a:rPr lang="en-US"/>
               <a:t>Fifth level</a:t>
             </a:r>
             <a:endParaRPr lang="en-US" dirty="0"/>
@@ -3747,7 +4183,7 @@
           <a:p>
             <a:pPr lvl="0"/>
             <a:r>
-              <a:rPr lang="en-US" smtClean="0"/>
+              <a:rPr lang="en-US"/>
               <a:t>Edit Master text styles</a:t>
             </a:r>
           </a:p>
@@ -3777,35 +4213,35 @@
           <a:p>
             <a:pPr lvl="0"/>
             <a:r>
-              <a:rPr lang="en-US" smtClean="0"/>
+              <a:rPr lang="en-US"/>
               <a:t>Edit Master text styles</a:t>
             </a:r>
           </a:p>
           <a:p>
             <a:pPr lvl="1"/>
             <a:r>
-              <a:rPr lang="en-US" smtClean="0"/>
+              <a:rPr lang="en-US"/>
               <a:t>Second level</a:t>
             </a:r>
           </a:p>
           <a:p>
             <a:pPr lvl="2"/>
             <a:r>
-              <a:rPr lang="en-US" smtClean="0"/>
+              <a:rPr lang="en-US"/>
               <a:t>Third level</a:t>
             </a:r>
           </a:p>
           <a:p>
             <a:pPr lvl="3"/>
             <a:r>
-              <a:rPr lang="en-US" smtClean="0"/>
+              <a:rPr lang="en-US"/>
               <a:t>Fourth level</a:t>
             </a:r>
           </a:p>
           <a:p>
             <a:pPr lvl="4"/>
             <a:r>
-              <a:rPr lang="en-US" smtClean="0"/>
+              <a:rPr lang="en-US"/>
               <a:t>Fifth level</a:t>
             </a:r>
             <a:endParaRPr lang="en-US" dirty="0"/>
@@ -3829,7 +4265,7 @@
           <a:p>
             <a:fld id="{52535105-08D2-4AB8-9573-02532F4EA060}" type="datetimeFigureOut">
               <a:rPr lang="en-US" smtClean="0"/>
-              <a:t>4/19/2016</a:t>
+              <a:t>4/20/2016</a:t>
             </a:fld>
             <a:endParaRPr lang="en-US"/>
           </a:p>
@@ -3928,7 +4364,7 @@
           <a:lstStyle/>
           <a:p>
             <a:r>
-              <a:rPr lang="en-US" smtClean="0"/>
+              <a:rPr lang="en-US"/>
               <a:t>Click to edit Master title style</a:t>
             </a:r>
             <a:endParaRPr lang="en-US" dirty="0"/>
@@ -3952,7 +4388,7 @@
           <a:p>
             <a:fld id="{52535105-08D2-4AB8-9573-02532F4EA060}" type="datetimeFigureOut">
               <a:rPr lang="en-US" smtClean="0"/>
-              <a:t>4/19/2016</a:t>
+              <a:t>4/20/2016</a:t>
             </a:fld>
             <a:endParaRPr lang="en-US"/>
           </a:p>
@@ -4047,7 +4483,7 @@
           <a:p>
             <a:fld id="{52535105-08D2-4AB8-9573-02532F4EA060}" type="datetimeFigureOut">
               <a:rPr lang="en-US" smtClean="0"/>
-              <a:t>4/19/2016</a:t>
+              <a:t>4/20/2016</a:t>
             </a:fld>
             <a:endParaRPr lang="en-US"/>
           </a:p>
@@ -4152,7 +4588,7 @@
           </a:lstStyle>
           <a:p>
             <a:r>
-              <a:rPr lang="en-US" smtClean="0"/>
+              <a:rPr lang="en-US"/>
               <a:t>Click to edit Master title style</a:t>
             </a:r>
             <a:endParaRPr lang="en-US" dirty="0"/>
@@ -4183,35 +4619,35 @@
           <a:p>
             <a:pPr lvl="0"/>
             <a:r>
-              <a:rPr lang="en-US" smtClean="0"/>
+              <a:rPr lang="en-US"/>
               <a:t>Edit Master text styles</a:t>
             </a:r>
           </a:p>
           <a:p>
             <a:pPr lvl="1"/>
             <a:r>
-              <a:rPr lang="en-US" smtClean="0"/>
+              <a:rPr lang="en-US"/>
               <a:t>Second level</a:t>
             </a:r>
           </a:p>
           <a:p>
             <a:pPr lvl="2"/>
             <a:r>
-              <a:rPr lang="en-US" smtClean="0"/>
+              <a:rPr lang="en-US"/>
               <a:t>Third level</a:t>
             </a:r>
           </a:p>
           <a:p>
             <a:pPr lvl="3"/>
             <a:r>
-              <a:rPr lang="en-US" smtClean="0"/>
+              <a:rPr lang="en-US"/>
               <a:t>Fourth level</a:t>
             </a:r>
           </a:p>
           <a:p>
             <a:pPr lvl="4"/>
             <a:r>
-              <a:rPr lang="en-US" smtClean="0"/>
+              <a:rPr lang="en-US"/>
               <a:t>Fifth level</a:t>
             </a:r>
             <a:endParaRPr lang="en-US" dirty="0"/>
@@ -4279,7 +4715,7 @@
           <a:p>
             <a:pPr lvl="0"/>
             <a:r>
-              <a:rPr lang="en-US" smtClean="0"/>
+              <a:rPr lang="en-US"/>
               <a:t>Edit Master text styles</a:t>
             </a:r>
           </a:p>
@@ -4302,7 +4738,7 @@
           <a:p>
             <a:fld id="{52535105-08D2-4AB8-9573-02532F4EA060}" type="datetimeFigureOut">
               <a:rPr lang="en-US" smtClean="0"/>
-              <a:t>4/19/2016</a:t>
+              <a:t>4/20/2016</a:t>
             </a:fld>
             <a:endParaRPr lang="en-US"/>
           </a:p>
@@ -4407,7 +4843,7 @@
           </a:lstStyle>
           <a:p>
             <a:r>
-              <a:rPr lang="en-US" smtClean="0"/>
+              <a:rPr lang="en-US"/>
               <a:t>Click to edit Master title style</a:t>
             </a:r>
             <a:endParaRPr lang="en-US" dirty="0"/>
@@ -4474,7 +4910,7 @@
           </a:lstStyle>
           <a:p>
             <a:r>
-              <a:rPr lang="en-US" smtClean="0"/>
+              <a:rPr lang="en-US"/>
               <a:t>Click icon to add picture</a:t>
             </a:r>
             <a:endParaRPr lang="en-US" dirty="0"/>
@@ -4542,7 +4978,7 @@
           <a:p>
             <a:pPr lvl="0"/>
             <a:r>
-              <a:rPr lang="en-US" smtClean="0"/>
+              <a:rPr lang="en-US"/>
               <a:t>Edit Master text styles</a:t>
             </a:r>
           </a:p>
@@ -4565,7 +5001,7 @@
           <a:p>
             <a:fld id="{52535105-08D2-4AB8-9573-02532F4EA060}" type="datetimeFigureOut">
               <a:rPr lang="en-US" smtClean="0"/>
-              <a:t>4/19/2016</a:t>
+              <a:t>4/20/2016</a:t>
             </a:fld>
             <a:endParaRPr lang="en-US"/>
           </a:p>
@@ -5204,7 +5640,7 @@
           <a:lstStyle/>
           <a:p>
             <a:r>
-              <a:rPr lang="en-US" smtClean="0"/>
+              <a:rPr lang="en-US"/>
               <a:t>Click to edit Master title style</a:t>
             </a:r>
             <a:endParaRPr lang="en-US" dirty="0"/>
@@ -5238,35 +5674,35 @@
           <a:p>
             <a:pPr lvl="0"/>
             <a:r>
-              <a:rPr lang="en-US" smtClean="0"/>
+              <a:rPr lang="en-US"/>
               <a:t>Edit Master text styles</a:t>
             </a:r>
           </a:p>
           <a:p>
             <a:pPr lvl="1"/>
             <a:r>
-              <a:rPr lang="en-US" smtClean="0"/>
+              <a:rPr lang="en-US"/>
               <a:t>Second level</a:t>
             </a:r>
           </a:p>
           <a:p>
             <a:pPr lvl="2"/>
             <a:r>
-              <a:rPr lang="en-US" smtClean="0"/>
+              <a:rPr lang="en-US"/>
               <a:t>Third level</a:t>
             </a:r>
           </a:p>
           <a:p>
             <a:pPr lvl="3"/>
             <a:r>
-              <a:rPr lang="en-US" smtClean="0"/>
+              <a:rPr lang="en-US"/>
               <a:t>Fourth level</a:t>
             </a:r>
           </a:p>
           <a:p>
             <a:pPr lvl="4"/>
             <a:r>
-              <a:rPr lang="en-US" smtClean="0"/>
+              <a:rPr lang="en-US"/>
               <a:t>Fifth level</a:t>
             </a:r>
             <a:endParaRPr lang="en-US" dirty="0"/>
@@ -5308,7 +5744,7 @@
           <a:p>
             <a:fld id="{52535105-08D2-4AB8-9573-02532F4EA060}" type="datetimeFigureOut">
               <a:rPr lang="en-US" smtClean="0"/>
-              <a:t>4/19/2016</a:t>
+              <a:t>4/20/2016</a:t>
             </a:fld>
             <a:endParaRPr lang="en-US"/>
           </a:p>
@@ -5844,7 +6280,7 @@
         </p:nvSpPr>
         <p:spPr>
           <a:xfrm>
-            <a:off x="1432560" y="653143"/>
+            <a:off x="848184" y="653143"/>
             <a:ext cx="9144000" cy="2856820"/>
           </a:xfrm>
         </p:spPr>
@@ -5855,57 +6291,29 @@
           <a:lstStyle/>
           <a:p>
             <a:pPr algn="ctr"/>
-            <a:r>
-              <a:rPr lang="en-US" sz="2000" dirty="0" smtClean="0"/>
-              <a:t/>
-            </a:r>
-            <a:br>
-              <a:rPr lang="en-US" sz="2000" dirty="0" smtClean="0"/>
-            </a:br>
-            <a:r>
-              <a:rPr lang="en-US" sz="2000" dirty="0" smtClean="0"/>
-              <a:t/>
-            </a:r>
-            <a:br>
-              <a:rPr lang="en-US" sz="2000" dirty="0" smtClean="0"/>
-            </a:br>
-            <a:r>
-              <a:rPr lang="en-US" sz="2000" dirty="0" smtClean="0"/>
-              <a:t/>
-            </a:r>
-            <a:br>
-              <a:rPr lang="en-US" sz="2000" dirty="0" smtClean="0"/>
-            </a:br>
-            <a:r>
-              <a:rPr lang="en-US" sz="2000" dirty="0"/>
-              <a:t/>
-            </a:r>
             <a:br>
               <a:rPr lang="en-US" sz="2000" dirty="0"/>
             </a:br>
-            <a:r>
-              <a:rPr lang="en-US" sz="2000" dirty="0" smtClean="0"/>
-              <a:t/>
-            </a:r>
-            <a:br>
-              <a:rPr lang="en-US" sz="2000" dirty="0" smtClean="0"/>
-            </a:br>
-            <a:r>
-              <a:rPr lang="en-US" sz="2000" dirty="0"/>
-              <a:t/>
-            </a:r>
             <a:br>
               <a:rPr lang="en-US" sz="2000" dirty="0"/>
             </a:br>
-            <a:r>
-              <a:rPr lang="en-US" sz="2000" dirty="0" smtClean="0"/>
-              <a:t/>
-            </a:r>
             <a:br>
-              <a:rPr lang="en-US" sz="2000" dirty="0" smtClean="0"/>
+              <a:rPr lang="en-US" sz="2000" dirty="0"/>
             </a:br>
-            <a:r>
-              <a:rPr lang="en-US" sz="3100" b="1" dirty="0" smtClean="0">
+            <a:br>
+              <a:rPr lang="en-US" sz="2000" dirty="0"/>
+            </a:br>
+            <a:br>
+              <a:rPr lang="en-US" sz="2000" dirty="0"/>
+            </a:br>
+            <a:br>
+              <a:rPr lang="en-US" sz="2000" dirty="0"/>
+            </a:br>
+            <a:br>
+              <a:rPr lang="en-US" sz="2000" dirty="0"/>
+            </a:br>
+            <a:r>
+              <a:rPr lang="en-US" sz="3100" b="1" dirty="0">
                 <a:effectLst>
                   <a:outerShdw blurRad="38100" dist="38100" dir="2700000" algn="tl">
                     <a:srgbClr val="000000">
@@ -5917,7 +6325,7 @@
               <a:t>GAME</a:t>
             </a:r>
             <a:br>
-              <a:rPr lang="en-US" sz="3100" b="1" dirty="0" smtClean="0">
+              <a:rPr lang="en-US" sz="3100" b="1" dirty="0">
                 <a:effectLst>
                   <a:outerShdw blurRad="38100" dist="38100" dir="2700000" algn="tl">
                     <a:srgbClr val="000000">
@@ -5928,7 +6336,7 @@
               </a:rPr>
             </a:br>
             <a:r>
-              <a:rPr lang="en-US" sz="3100" b="1" dirty="0" smtClean="0">
+              <a:rPr lang="en-US" sz="3100" b="1" dirty="0">
                 <a:effectLst>
                   <a:outerShdw blurRad="38100" dist="38100" dir="2700000" algn="tl">
                     <a:srgbClr val="000000">
@@ -5940,7 +6348,7 @@
               <a:t>“FALLING EGGS”</a:t>
             </a:r>
             <a:br>
-              <a:rPr lang="en-US" sz="3100" b="1" dirty="0" smtClean="0">
+              <a:rPr lang="en-US" sz="3100" b="1" dirty="0">
                 <a:effectLst>
                   <a:outerShdw blurRad="38100" dist="38100" dir="2700000" algn="tl">
                     <a:srgbClr val="000000">
@@ -5950,22 +6358,14 @@
                 </a:effectLst>
               </a:rPr>
             </a:br>
-            <a:r>
-              <a:rPr lang="en-US" sz="3100" b="1" dirty="0" smtClean="0"/>
-              <a:t/>
-            </a:r>
             <a:br>
-              <a:rPr lang="en-US" sz="3100" b="1" dirty="0" smtClean="0"/>
+              <a:rPr lang="en-US" sz="3100" b="1" dirty="0"/>
             </a:br>
-            <a:r>
-              <a:rPr lang="en-US" sz="2000" dirty="0"/>
-              <a:t/>
-            </a:r>
             <a:br>
               <a:rPr lang="en-US" sz="2000" dirty="0"/>
             </a:br>
             <a:r>
-              <a:rPr lang="en-US" sz="3100" b="1" dirty="0" smtClean="0">
+              <a:rPr lang="en-US" sz="3100" b="1" dirty="0">
                 <a:effectLst>
                   <a:outerShdw blurRad="38100" dist="38100" dir="2700000" algn="tl">
                     <a:srgbClr val="000000">
@@ -5977,7 +6377,7 @@
               <a:t>TEAM</a:t>
             </a:r>
             <a:br>
-              <a:rPr lang="en-US" sz="3100" b="1" dirty="0" smtClean="0">
+              <a:rPr lang="en-US" sz="3100" b="1" dirty="0">
                 <a:effectLst>
                   <a:outerShdw blurRad="38100" dist="38100" dir="2700000" algn="tl">
                     <a:srgbClr val="000000">
@@ -5988,7 +6388,7 @@
               </a:rPr>
             </a:br>
             <a:r>
-              <a:rPr lang="en-US" sz="3100" b="1" dirty="0" smtClean="0">
+              <a:rPr lang="en-US" sz="3100" b="1" dirty="0">
                 <a:effectLst>
                   <a:outerShdw blurRad="38100" dist="38100" dir="2700000" algn="tl">
                     <a:srgbClr val="000000">
@@ -6000,7 +6400,7 @@
               <a:t>“NEW ORLEANS”</a:t>
             </a:r>
             <a:br>
-              <a:rPr lang="en-US" sz="3100" b="1" dirty="0" smtClean="0">
+              <a:rPr lang="en-US" sz="3100" b="1" dirty="0">
                 <a:effectLst>
                   <a:outerShdw blurRad="38100" dist="38100" dir="2700000" algn="tl">
                     <a:srgbClr val="000000">
@@ -6010,18 +6410,6 @@
                 </a:effectLst>
               </a:rPr>
             </a:br>
-            <a:r>
-              <a:rPr lang="en-US" sz="2700" b="1" dirty="0">
-                <a:effectLst>
-                  <a:outerShdw blurRad="38100" dist="38100" dir="2700000" algn="tl">
-                    <a:srgbClr val="000000">
-                      <a:alpha val="43137"/>
-                    </a:srgbClr>
-                  </a:outerShdw>
-                </a:effectLst>
-              </a:rPr>
-              <a:t/>
-            </a:r>
             <a:br>
               <a:rPr lang="en-US" sz="2700" b="1" dirty="0">
                 <a:effectLst>
@@ -6069,7 +6457,7 @@
           <a:p>
             <a:pPr algn="r"/>
             <a:r>
-              <a:rPr lang="en-US" sz="2800" i="1" dirty="0" err="1" smtClean="0">
+              <a:rPr lang="en-US" sz="2800" i="1" dirty="0" err="1">
                 <a:effectLst>
                   <a:outerShdw blurRad="38100" dist="38100" dir="2700000" algn="tl">
                     <a:srgbClr val="000000">
@@ -6081,7 +6469,7 @@
               <a:t>Lubomir</a:t>
             </a:r>
             <a:r>
-              <a:rPr lang="en-US" sz="2800" i="1" dirty="0" smtClean="0">
+              <a:rPr lang="en-US" sz="2800" i="1" dirty="0">
                 <a:effectLst>
                   <a:outerShdw blurRad="38100" dist="38100" dir="2700000" algn="tl">
                     <a:srgbClr val="000000">
@@ -6093,7 +6481,7 @@
               <a:t> </a:t>
             </a:r>
             <a:r>
-              <a:rPr lang="en-US" sz="2800" i="1" dirty="0" err="1" smtClean="0">
+              <a:rPr lang="en-US" sz="2800" i="1" dirty="0" err="1">
                 <a:effectLst>
                   <a:outerShdw blurRad="38100" dist="38100" dir="2700000" algn="tl">
                     <a:srgbClr val="000000">
@@ -6104,7 +6492,7 @@
               </a:rPr>
               <a:t>Gojchev</a:t>
             </a:r>
-            <a:endParaRPr lang="en-US" sz="2800" i="1" dirty="0" smtClean="0">
+            <a:endParaRPr lang="bg-BG" sz="2800" i="1" dirty="0">
               <a:effectLst>
                 <a:outerShdw blurRad="38100" dist="38100" dir="2700000" algn="tl">
                   <a:srgbClr val="000000">
@@ -6117,7 +6505,7 @@
           <a:p>
             <a:pPr algn="r"/>
             <a:r>
-              <a:rPr lang="en-US" sz="2800" i="1" dirty="0" err="1" smtClean="0">
+              <a:rPr lang="en-US" sz="2800" i="1" dirty="0" err="1">
                 <a:effectLst>
                   <a:outerShdw blurRad="38100" dist="38100" dir="2700000" algn="tl">
                     <a:srgbClr val="000000">
@@ -6129,7 +6517,7 @@
               <a:t>Genoveva</a:t>
             </a:r>
             <a:r>
-              <a:rPr lang="en-US" sz="2800" i="1" dirty="0" smtClean="0">
+              <a:rPr lang="en-US" sz="2800" i="1" dirty="0">
                 <a:effectLst>
                   <a:outerShdw blurRad="38100" dist="38100" dir="2700000" algn="tl">
                     <a:srgbClr val="000000">
@@ -6141,7 +6529,7 @@
               <a:t> </a:t>
             </a:r>
             <a:r>
-              <a:rPr lang="en-US" sz="2800" i="1" dirty="0" err="1" smtClean="0">
+              <a:rPr lang="en-US" sz="2800" i="1" dirty="0" err="1">
                 <a:effectLst>
                   <a:outerShdw blurRad="38100" dist="38100" dir="2700000" algn="tl">
                     <a:srgbClr val="000000">
@@ -6152,7 +6540,7 @@
               </a:rPr>
               <a:t>Ivanova</a:t>
             </a:r>
-            <a:endParaRPr lang="en-US" sz="2800" i="1" dirty="0" smtClean="0">
+            <a:endParaRPr lang="en-US" sz="2800" i="1" dirty="0">
               <a:effectLst>
                 <a:outerShdw blurRad="38100" dist="38100" dir="2700000" algn="tl">
                   <a:srgbClr val="000000">
@@ -6165,7 +6553,7 @@
           <a:p>
             <a:pPr algn="r"/>
             <a:r>
-              <a:rPr lang="en-US" sz="2800" i="1" dirty="0" err="1" smtClean="0">
+              <a:rPr lang="en-US" sz="2800" i="1" dirty="0" err="1">
                 <a:effectLst>
                   <a:outerShdw blurRad="38100" dist="38100" dir="2700000" algn="tl">
                     <a:srgbClr val="000000">
@@ -6177,7 +6565,7 @@
               <a:t>Aneliq</a:t>
             </a:r>
             <a:r>
-              <a:rPr lang="en-US" sz="2800" i="1" dirty="0" smtClean="0">
+              <a:rPr lang="en-US" sz="2800" i="1" dirty="0">
                 <a:effectLst>
                   <a:outerShdw blurRad="38100" dist="38100" dir="2700000" algn="tl">
                     <a:srgbClr val="000000">
@@ -6189,7 +6577,7 @@
               <a:t> </a:t>
             </a:r>
             <a:r>
-              <a:rPr lang="en-US" sz="2800" i="1" dirty="0" err="1" smtClean="0">
+              <a:rPr lang="en-US" sz="2800" i="1" dirty="0" err="1">
                 <a:effectLst>
                   <a:outerShdw blurRad="38100" dist="38100" dir="2700000" algn="tl">
                     <a:srgbClr val="000000">
@@ -6200,7 +6588,7 @@
               </a:rPr>
               <a:t>Stoilova</a:t>
             </a:r>
-            <a:endParaRPr lang="en-US" sz="2800" i="1" dirty="0" smtClean="0">
+            <a:endParaRPr lang="en-US" sz="2800" i="1" dirty="0">
               <a:effectLst>
                 <a:outerShdw blurRad="38100" dist="38100" dir="2700000" algn="tl">
                   <a:srgbClr val="000000">
@@ -6213,7 +6601,7 @@
           <a:p>
             <a:pPr algn="r"/>
             <a:r>
-              <a:rPr lang="en-US" sz="2800" i="1" strike="sngStrike" dirty="0" smtClean="0">
+              <a:rPr lang="en-US" sz="2800" i="1" strike="sngStrike" dirty="0">
                 <a:effectLst>
                   <a:outerShdw blurRad="38100" dist="38100" dir="2700000" algn="tl">
                     <a:srgbClr val="000000">
@@ -6225,7 +6613,7 @@
               <a:t>Iliana </a:t>
             </a:r>
             <a:r>
-              <a:rPr lang="en-US" sz="2800" i="1" strike="sngStrike" dirty="0" err="1" smtClean="0">
+              <a:rPr lang="en-US" sz="2800" i="1" strike="sngStrike" dirty="0" err="1">
                 <a:effectLst>
                   <a:outerShdw blurRad="38100" dist="38100" dir="2700000" algn="tl">
                     <a:srgbClr val="000000">
@@ -6236,7 +6624,19 @@
               </a:rPr>
               <a:t>Vachkova</a:t>
             </a:r>
-            <a:endParaRPr lang="bg-BG" sz="2800" i="1" strike="sngStrike" dirty="0" smtClean="0">
+            <a:r>
+              <a:rPr lang="en-US" sz="2800" i="1" dirty="0">
+                <a:effectLst>
+                  <a:outerShdw blurRad="38100" dist="38100" dir="2700000" algn="tl">
+                    <a:srgbClr val="000000">
+                      <a:alpha val="43137"/>
+                    </a:srgbClr>
+                  </a:outerShdw>
+                </a:effectLst>
+              </a:rPr>
+              <a:t> – she gave up</a:t>
+            </a:r>
+            <a:endParaRPr lang="bg-BG" sz="2800" i="1" dirty="0">
               <a:effectLst>
                 <a:outerShdw blurRad="38100" dist="38100" dir="2700000" algn="tl">
                   <a:srgbClr val="000000">
@@ -6258,13 +6658,6 @@
   <p:clrMapOvr>
     <a:masterClrMapping/>
   </p:clrMapOvr>
-  <p:timing>
-    <p:tnLst>
-      <p:par>
-        <p:cTn id="1" dur="indefinite" restart="never" nodeType="tmRoot"/>
-      </p:par>
-    </p:tnLst>
-  </p:timing>
 </p:sld>
 </file>
 
@@ -6309,7 +6702,7 @@
           <a:p>
             <a:pPr algn="ctr"/>
             <a:r>
-              <a:rPr lang="en-US" b="1" dirty="0" smtClean="0">
+              <a:rPr lang="en-US" b="1" dirty="0">
                 <a:effectLst>
                   <a:outerShdw blurRad="38100" dist="38100" dir="2700000" algn="tl">
                     <a:srgbClr val="000000">
@@ -6320,15 +6713,6 @@
               </a:rPr>
               <a:t>Short description</a:t>
             </a:r>
-            <a:endParaRPr lang="en-US" b="1" dirty="0">
-              <a:effectLst>
-                <a:outerShdw blurRad="38100" dist="38100" dir="2700000" algn="tl">
-                  <a:srgbClr val="000000">
-                    <a:alpha val="43137"/>
-                  </a:srgbClr>
-                </a:outerShdw>
-              </a:effectLst>
-            </a:endParaRPr>
           </a:p>
         </p:txBody>
       </p:sp>
@@ -6344,13 +6728,13 @@
         </p:nvSpPr>
         <p:spPr>
           <a:xfrm>
-            <a:off x="838200" y="3187337"/>
-            <a:ext cx="10515600" cy="2989626"/>
+            <a:off x="1133004" y="2794069"/>
+            <a:ext cx="9072563" cy="2923756"/>
           </a:xfrm>
         </p:spPr>
         <p:txBody>
-          <a:bodyPr>
-            <a:normAutofit/>
+          <a:bodyPr vert="horz" lIns="91440" tIns="45720" rIns="91440" bIns="45720" rtlCol="0" anchor="t">
+            <a:normAutofit fontScale="92500"/>
           </a:bodyPr>
           <a:lstStyle/>
           <a:p>
@@ -6358,7 +6742,10 @@
               <a:buNone/>
             </a:pPr>
             <a:r>
-              <a:rPr lang="en-US" i="1" dirty="0" smtClean="0">
+              <a:rPr lang="en-US" sz="2000" i="1" dirty="0">
+                <a:solidFill>
+                  <a:srgbClr val="7F7F7F"/>
+                </a:solidFill>
                 <a:effectLst>
                   <a:outerShdw blurRad="38100" dist="38100" dir="2700000" algn="tl">
                     <a:srgbClr val="000000">
@@ -6370,7 +6757,10 @@
               <a:t>“Falling Eggs” is a funny game</a:t>
             </a:r>
             <a:r>
-              <a:rPr lang="bg-BG" i="1" dirty="0" smtClean="0">
+              <a:rPr lang="bg-BG" sz="2000" i="1" dirty="0">
+                <a:solidFill>
+                  <a:srgbClr val="7F7F7F"/>
+                </a:solidFill>
                 <a:effectLst>
                   <a:outerShdw blurRad="38100" dist="38100" dir="2700000" algn="tl">
                     <a:srgbClr val="000000">
@@ -6382,7 +6772,10 @@
               <a:t> </a:t>
             </a:r>
             <a:r>
-              <a:rPr lang="en-US" i="1" dirty="0" smtClean="0">
+              <a:rPr lang="en-US" sz="2000" i="1" dirty="0">
+                <a:solidFill>
+                  <a:srgbClr val="7F7F7F"/>
+                </a:solidFill>
                 <a:effectLst>
                   <a:outerShdw blurRad="38100" dist="38100" dir="2700000" algn="tl">
                     <a:srgbClr val="000000">
@@ -6398,7 +6791,7 @@
             <a:pPr marL="0" indent="0">
               <a:buNone/>
             </a:pPr>
-            <a:endParaRPr lang="en-US" i="1" dirty="0" smtClean="0">
+            <a:endParaRPr lang="en-US" i="1" dirty="0">
               <a:effectLst>
                 <a:outerShdw blurRad="38100" dist="38100" dir="2700000" algn="tl">
                   <a:srgbClr val="000000">
@@ -6413,7 +6806,10 @@
               <a:buNone/>
             </a:pPr>
             <a:r>
-              <a:rPr lang="en-US" i="1" dirty="0" smtClean="0">
+              <a:rPr lang="en-US" sz="2000" i="1" dirty="0">
+                <a:solidFill>
+                  <a:srgbClr val="7F7F7F"/>
+                </a:solidFill>
                 <a:effectLst>
                   <a:outerShdw blurRad="38100" dist="38100" dir="2700000" algn="tl">
                     <a:srgbClr val="000000">
@@ -6425,7 +6821,10 @@
               <a:t>Your task is to</a:t>
             </a:r>
             <a:r>
-              <a:rPr lang="bg-BG" i="1" dirty="0" smtClean="0">
+              <a:rPr lang="bg-BG" sz="2000" i="1" dirty="0">
+                <a:solidFill>
+                  <a:srgbClr val="7F7F7F"/>
+                </a:solidFill>
                 <a:effectLst>
                   <a:outerShdw blurRad="38100" dist="38100" dir="2700000" algn="tl">
                     <a:srgbClr val="000000">
@@ -6437,7 +6836,10 @@
               <a:t> </a:t>
             </a:r>
             <a:r>
-              <a:rPr lang="en-US" i="1" dirty="0" smtClean="0">
+              <a:rPr lang="en-US" sz="2000" i="1" dirty="0">
+                <a:solidFill>
+                  <a:srgbClr val="7F7F7F"/>
+                </a:solidFill>
                 <a:effectLst>
                   <a:outerShdw blurRad="38100" dist="38100" dir="2700000" algn="tl">
                     <a:srgbClr val="000000">
@@ -6446,58 +6848,29 @@
                   </a:outerShdw>
                 </a:effectLst>
               </a:rPr>
-              <a:t>catch as you can eggs and chicks</a:t>
-            </a:r>
-            <a:r>
-              <a:rPr lang="en-US" i="1" dirty="0">
-                <a:effectLst>
-                  <a:outerShdw blurRad="38100" dist="38100" dir="2700000" algn="tl">
-                    <a:srgbClr val="000000">
-                      <a:alpha val="43137"/>
-                    </a:srgbClr>
-                  </a:outerShdw>
-                </a:effectLst>
-              </a:rPr>
-              <a:t>. </a:t>
-            </a:r>
-            <a:r>
-              <a:rPr lang="en-US" i="1" dirty="0" smtClean="0">
-                <a:effectLst>
-                  <a:outerShdw blurRad="38100" dist="38100" dir="2700000" algn="tl">
-                    <a:srgbClr val="000000">
-                      <a:alpha val="43137"/>
-                    </a:srgbClr>
-                  </a:outerShdw>
-                </a:effectLst>
-              </a:rPr>
-              <a:t>The </a:t>
-            </a:r>
-            <a:r>
-              <a:rPr lang="en-US" i="1" dirty="0">
-                <a:effectLst>
-                  <a:outerShdw blurRad="38100" dist="38100" dir="2700000" algn="tl">
-                    <a:srgbClr val="000000">
-                      <a:alpha val="43137"/>
-                    </a:srgbClr>
-                  </a:outerShdw>
-                </a:effectLst>
-              </a:rPr>
-              <a:t>game stops </a:t>
-            </a:r>
-            <a:r>
-              <a:rPr lang="en-US" i="1" dirty="0" smtClean="0">
-                <a:effectLst>
-                  <a:outerShdw blurRad="38100" dist="38100" dir="2700000" algn="tl">
-                    <a:srgbClr val="000000">
-                      <a:alpha val="43137"/>
-                    </a:srgbClr>
-                  </a:outerShdw>
-                </a:effectLst>
-              </a:rPr>
-              <a:t>if</a:t>
-            </a:r>
-            <a:r>
-              <a:rPr lang="en-US" i="1" dirty="0" smtClean="0">
+              <a:t>catch as you can eggs and chicks. The game stops if you collect</a:t>
+            </a:r>
+          </a:p>
+          <a:p>
+            <a:pPr marL="0" indent="0">
+              <a:buNone/>
+            </a:pPr>
+            <a:endParaRPr lang="en-US" i="1" dirty="0">
+              <a:effectLst>
+                <a:outerShdw blurRad="38100" dist="38100" dir="2700000" algn="tl">
+                  <a:srgbClr val="000000">
+                    <a:alpha val="43137"/>
+                  </a:srgbClr>
+                </a:outerShdw>
+              </a:effectLst>
+            </a:endParaRPr>
+          </a:p>
+          <a:p>
+            <a:pPr marL="0" indent="0">
+              <a:buNone/>
+            </a:pPr>
+            <a:r>
+              <a:rPr lang="en-US" sz="2000" i="1" dirty="0">
                 <a:effectLst>
                   <a:outerShdw blurRad="38100" dist="38100" dir="2700000" algn="tl">
                     <a:srgbClr val="000000">
@@ -6509,7 +6882,10 @@
               <a:t> </a:t>
             </a:r>
             <a:r>
-              <a:rPr lang="en-US" i="1" dirty="0">
+              <a:rPr lang="en-US" sz="2000" i="1" dirty="0">
+                <a:solidFill>
+                  <a:srgbClr val="7F7F7F"/>
+                </a:solidFill>
                 <a:effectLst>
                   <a:outerShdw blurRad="38100" dist="38100" dir="2700000" algn="tl">
                     <a:srgbClr val="000000">
@@ -6518,175 +6894,13 @@
                   </a:outerShdw>
                 </a:effectLst>
               </a:rPr>
-              <a:t>you </a:t>
-            </a:r>
-            <a:r>
-              <a:rPr lang="en-US" i="1" dirty="0" smtClean="0">
-                <a:effectLst>
-                  <a:outerShdw blurRad="38100" dist="38100" dir="2700000" algn="tl">
-                    <a:srgbClr val="000000">
-                      <a:alpha val="43137"/>
-                    </a:srgbClr>
-                  </a:outerShdw>
-                </a:effectLst>
-              </a:rPr>
-              <a:t>collect</a:t>
+              <a:t>all falling eggs and chicks or you reach 25 points. But you have to watch out </a:t>
             </a:r>
           </a:p>
           <a:p>
             <a:pPr marL="0" indent="0">
               <a:buNone/>
             </a:pPr>
-            <a:endParaRPr lang="en-US" i="1" dirty="0" smtClean="0">
-              <a:effectLst>
-                <a:outerShdw blurRad="38100" dist="38100" dir="2700000" algn="tl">
-                  <a:srgbClr val="000000">
-                    <a:alpha val="43137"/>
-                  </a:srgbClr>
-                </a:outerShdw>
-              </a:effectLst>
-            </a:endParaRPr>
-          </a:p>
-          <a:p>
-            <a:pPr marL="0" indent="0">
-              <a:buNone/>
-            </a:pPr>
-            <a:r>
-              <a:rPr lang="en-US" i="1" dirty="0" smtClean="0">
-                <a:effectLst>
-                  <a:outerShdw blurRad="38100" dist="38100" dir="2700000" algn="tl">
-                    <a:srgbClr val="000000">
-                      <a:alpha val="43137"/>
-                    </a:srgbClr>
-                  </a:outerShdw>
-                </a:effectLst>
-              </a:rPr>
-              <a:t> </a:t>
-            </a:r>
-            <a:r>
-              <a:rPr lang="en-US" i="1" dirty="0">
-                <a:effectLst>
-                  <a:outerShdw blurRad="38100" dist="38100" dir="2700000" algn="tl">
-                    <a:srgbClr val="000000">
-                      <a:alpha val="43137"/>
-                    </a:srgbClr>
-                  </a:outerShdw>
-                </a:effectLst>
-              </a:rPr>
-              <a:t>all falling eggs and </a:t>
-            </a:r>
-            <a:r>
-              <a:rPr lang="en-US" i="1" dirty="0" smtClean="0">
-                <a:effectLst>
-                  <a:outerShdw blurRad="38100" dist="38100" dir="2700000" algn="tl">
-                    <a:srgbClr val="000000">
-                      <a:alpha val="43137"/>
-                    </a:srgbClr>
-                  </a:outerShdw>
-                </a:effectLst>
-              </a:rPr>
-              <a:t>chicks or you reach 25 points . </a:t>
-            </a:r>
-            <a:r>
-              <a:rPr lang="en-US" i="1" dirty="0" smtClean="0">
-                <a:effectLst>
-                  <a:outerShdw blurRad="38100" dist="38100" dir="2700000" algn="tl">
-                    <a:srgbClr val="000000">
-                      <a:alpha val="43137"/>
-                    </a:srgbClr>
-                  </a:outerShdw>
-                </a:effectLst>
-              </a:rPr>
-              <a:t>But </a:t>
-            </a:r>
-            <a:r>
-              <a:rPr lang="en-US" i="1" dirty="0" smtClean="0">
-                <a:effectLst>
-                  <a:outerShdw blurRad="38100" dist="38100" dir="2700000" algn="tl">
-                    <a:srgbClr val="000000">
-                      <a:alpha val="43137"/>
-                    </a:srgbClr>
-                  </a:outerShdw>
-                </a:effectLst>
-              </a:rPr>
-              <a:t>you have to watch </a:t>
-            </a:r>
-            <a:r>
-              <a:rPr lang="en-US" i="1" dirty="0" smtClean="0">
-                <a:effectLst>
-                  <a:outerShdw blurRad="38100" dist="38100" dir="2700000" algn="tl">
-                    <a:srgbClr val="000000">
-                      <a:alpha val="43137"/>
-                    </a:srgbClr>
-                  </a:outerShdw>
-                </a:effectLst>
-              </a:rPr>
-              <a:t>out </a:t>
-            </a:r>
-            <a:endParaRPr lang="en-US" i="1" dirty="0" smtClean="0">
-              <a:effectLst>
-                <a:outerShdw blurRad="38100" dist="38100" dir="2700000" algn="tl">
-                  <a:srgbClr val="000000">
-                    <a:alpha val="43137"/>
-                  </a:srgbClr>
-                </a:outerShdw>
-              </a:effectLst>
-            </a:endParaRPr>
-          </a:p>
-          <a:p>
-            <a:pPr marL="0" indent="0">
-              <a:buNone/>
-            </a:pPr>
-            <a:endParaRPr lang="en-US" i="1" dirty="0" smtClean="0">
-              <a:effectLst>
-                <a:outerShdw blurRad="38100" dist="38100" dir="2700000" algn="tl">
-                  <a:srgbClr val="000000">
-                    <a:alpha val="43137"/>
-                  </a:srgbClr>
-                </a:outerShdw>
-              </a:effectLst>
-            </a:endParaRPr>
-          </a:p>
-          <a:p>
-            <a:pPr marL="0" indent="0">
-              <a:buNone/>
-            </a:pPr>
-            <a:r>
-              <a:rPr lang="en-US" i="1" dirty="0" smtClean="0">
-                <a:effectLst>
-                  <a:outerShdw blurRad="38100" dist="38100" dir="2700000" algn="tl">
-                    <a:srgbClr val="000000">
-                      <a:alpha val="43137"/>
-                    </a:srgbClr>
-                  </a:outerShdw>
-                </a:effectLst>
-              </a:rPr>
-              <a:t>for </a:t>
-            </a:r>
-            <a:r>
-              <a:rPr lang="en-US" i="1" dirty="0" smtClean="0">
-                <a:effectLst>
-                  <a:outerShdw blurRad="38100" dist="38100" dir="2700000" algn="tl">
-                    <a:srgbClr val="000000">
-                      <a:alpha val="43137"/>
-                    </a:srgbClr>
-                  </a:outerShdw>
-                </a:effectLst>
-              </a:rPr>
-              <a:t>falling </a:t>
-            </a:r>
-            <a:r>
-              <a:rPr lang="en-US" i="1" dirty="0" smtClean="0">
-                <a:effectLst>
-                  <a:outerShdw blurRad="38100" dist="38100" dir="2700000" algn="tl">
-                    <a:srgbClr val="000000">
-                      <a:alpha val="43137"/>
-                    </a:srgbClr>
-                  </a:outerShdw>
-                </a:effectLst>
-              </a:rPr>
-              <a:t>rocks  because you will lose 3 points.</a:t>
-            </a:r>
             <a:endParaRPr lang="en-US" i="1" dirty="0">
               <a:effectLst>
                 <a:outerShdw blurRad="38100" dist="38100" dir="2700000" algn="tl">
@@ -6696,6 +6910,26 @@
                 </a:outerShdw>
               </a:effectLst>
             </a:endParaRPr>
+          </a:p>
+          <a:p>
+            <a:pPr marL="0" indent="0">
+              <a:buNone/>
+            </a:pPr>
+            <a:r>
+              <a:rPr lang="en-US" sz="2000" i="1" dirty="0">
+                <a:solidFill>
+                  <a:srgbClr val="7F7F7F"/>
+                </a:solidFill>
+                <a:effectLst>
+                  <a:outerShdw blurRad="38100" dist="38100" dir="2700000" algn="tl">
+                    <a:srgbClr val="000000">
+                      <a:alpha val="43137"/>
+                    </a:srgbClr>
+                  </a:outerShdw>
+                </a:effectLst>
+              </a:rPr>
+              <a:t>for falling rocks because you will lose 3 points.</a:t>
+            </a:r>
           </a:p>
         </p:txBody>
       </p:sp>
@@ -6709,13 +6943,6 @@
   <p:clrMapOvr>
     <a:masterClrMapping/>
   </p:clrMapOvr>
-  <p:timing>
-    <p:tnLst>
-      <p:par>
-        <p:cTn id="1" dur="indefinite" restart="never" nodeType="tmRoot"/>
-      </p:par>
-    </p:tnLst>
-  </p:timing>
 </p:sld>
 </file>
 
@@ -6760,7 +6987,7 @@
           <a:p>
             <a:pPr algn="ctr"/>
             <a:r>
-              <a:rPr lang="en-US" sz="3600" b="1" dirty="0" smtClean="0">
+              <a:rPr lang="en-US" sz="3600" b="1" dirty="0">
                 <a:effectLst>
                   <a:outerShdw blurRad="38100" dist="38100" dir="2700000" algn="tl">
                     <a:srgbClr val="000000">
@@ -6771,20 +6998,8 @@
               </a:rPr>
               <a:t>Gameplay</a:t>
             </a:r>
-            <a:r>
-              <a:rPr lang="en-US" sz="2800" b="1" dirty="0" smtClean="0">
-                <a:effectLst>
-                  <a:outerShdw blurRad="38100" dist="38100" dir="2700000" algn="tl">
-                    <a:srgbClr val="000000">
-                      <a:alpha val="43137"/>
-                    </a:srgbClr>
-                  </a:outerShdw>
-                </a:effectLst>
-              </a:rPr>
-              <a:t/>
-            </a:r>
             <a:br>
-              <a:rPr lang="en-US" sz="2800" b="1" dirty="0" smtClean="0">
+              <a:rPr lang="en-US" sz="2800" b="1" dirty="0">
                 <a:effectLst>
                   <a:outerShdw blurRad="38100" dist="38100" dir="2700000" algn="tl">
                     <a:srgbClr val="000000">
@@ -6794,24 +7009,12 @@
                 </a:effectLst>
               </a:rPr>
             </a:br>
-            <a:r>
-              <a:rPr lang="en-US" sz="2800" dirty="0"/>
-              <a:t/>
-            </a:r>
             <a:br>
               <a:rPr lang="en-US" sz="2800" dirty="0"/>
             </a:br>
-            <a:r>
-              <a:rPr lang="en-US" sz="2800" dirty="0" smtClean="0"/>
-              <a:t/>
-            </a:r>
             <a:br>
-              <a:rPr lang="en-US" sz="2800" dirty="0" smtClean="0"/>
+              <a:rPr lang="en-US" sz="2800" dirty="0"/>
             </a:br>
-            <a:r>
-              <a:rPr lang="en-US" sz="2800" dirty="0"/>
-              <a:t/>
-            </a:r>
             <a:br>
               <a:rPr lang="en-US" sz="2800" dirty="0"/>
             </a:br>
@@ -6819,54 +7022,24 @@
           </a:p>
         </p:txBody>
       </p:sp>
-      <p:sp>
-        <p:nvSpPr>
-          <p:cNvPr id="3" name="Subtitle 2"/>
-          <p:cNvSpPr>
-            <a:spLocks noGrp="1"/>
-          </p:cNvSpPr>
-          <p:nvPr>
-            <p:ph type="subTitle" idx="1"/>
-          </p:nvPr>
-        </p:nvSpPr>
-        <p:spPr>
-          <a:xfrm>
-            <a:off x="1507067" y="2364377"/>
-            <a:ext cx="7766936" cy="2783355"/>
-          </a:xfrm>
-        </p:spPr>
-        <p:txBody>
-          <a:bodyPr/>
-          <a:lstStyle/>
-          <a:p>
-            <a:endParaRPr lang="en-US" dirty="0"/>
-          </a:p>
-        </p:txBody>
-      </p:sp>
       <p:pic>
         <p:nvPicPr>
-          <p:cNvPr id="4" name="Picture 3"/>
+          <p:cNvPr id="4" name="Picture 3" descr="help.png"/>
           <p:cNvPicPr>
             <a:picLocks noChangeAspect="1"/>
           </p:cNvPicPr>
           <p:nvPr/>
         </p:nvPicPr>
         <p:blipFill>
-          <a:blip r:embed="rId2">
-            <a:extLst>
-              <a:ext uri="{28A0092B-C50C-407E-A947-70E740481C1C}">
-                <a14:useLocalDpi xmlns:a14="http://schemas.microsoft.com/office/drawing/2010/main" val="0"/>
-              </a:ext>
-            </a:extLst>
-          </a:blip>
+          <a:blip r:embed="rId3"/>
           <a:stretch>
             <a:fillRect/>
           </a:stretch>
         </p:blipFill>
         <p:spPr>
           <a:xfrm>
-            <a:off x="1308297" y="1943836"/>
-            <a:ext cx="8342140" cy="4019644"/>
+            <a:off x="2573944" y="2237199"/>
+            <a:ext cx="6186487" cy="3698321"/>
           </a:xfrm>
           <a:prstGeom prst="rect">
             <a:avLst/>
@@ -6883,21 +7056,6 @@
   <p:clrMapOvr>
     <a:masterClrMapping/>
   </p:clrMapOvr>
-  <mc:AlternateContent xmlns:mc="http://schemas.openxmlformats.org/markup-compatibility/2006" xmlns:p14="http://schemas.microsoft.com/office/powerpoint/2010/main">
-    <mc:Choice Requires="p14">
-      <p:transition spd="slow" p14:dur="2000"/>
-    </mc:Choice>
-    <mc:Fallback xmlns="">
-      <p:transition spd="slow"/>
-    </mc:Fallback>
-  </mc:AlternateContent>
-  <p:timing>
-    <p:tnLst>
-      <p:par>
-        <p:cTn id="1" dur="indefinite" restart="never" nodeType="tmRoot"/>
-      </p:par>
-    </p:tnLst>
-  </p:timing>
 </p:sld>
 </file>
 
@@ -6930,19 +7088,19 @@
         </p:nvSpPr>
         <p:spPr>
           <a:xfrm>
-            <a:off x="1524000" y="261257"/>
-            <a:ext cx="9144000" cy="3357154"/>
+            <a:off x="506785" y="261938"/>
+            <a:ext cx="9061967" cy="3060655"/>
           </a:xfrm>
         </p:spPr>
         <p:txBody>
           <a:bodyPr>
-            <a:normAutofit/>
+            <a:normAutofit fontScale="90000"/>
           </a:bodyPr>
           <a:lstStyle/>
           <a:p>
             <a:pPr algn="ctr"/>
             <a:r>
-              <a:rPr lang="en-US" sz="3600" b="1" dirty="0" smtClean="0">
+              <a:rPr lang="en-US" sz="3600" b="1" dirty="0">
                 <a:effectLst>
                   <a:outerShdw blurRad="38100" dist="38100" dir="2700000" algn="tl">
                     <a:srgbClr val="000000">
@@ -6952,64 +7110,6 @@
                 </a:effectLst>
               </a:rPr>
               <a:t>Technical description</a:t>
-            </a:r>
-            <a:r>
-              <a:rPr lang="en-US" sz="2800" b="1" dirty="0" smtClean="0">
-                <a:effectLst>
-                  <a:outerShdw blurRad="38100" dist="38100" dir="2700000" algn="tl">
-                    <a:srgbClr val="000000">
-                      <a:alpha val="43137"/>
-                    </a:srgbClr>
-                  </a:outerShdw>
-                </a:effectLst>
-              </a:rPr>
-              <a:t/>
-            </a:r>
-            <a:br>
-              <a:rPr lang="en-US" sz="2800" b="1" dirty="0" smtClean="0">
-                <a:effectLst>
-                  <a:outerShdw blurRad="38100" dist="38100" dir="2700000" algn="tl">
-                    <a:srgbClr val="000000">
-                      <a:alpha val="43137"/>
-                    </a:srgbClr>
-                  </a:outerShdw>
-                </a:effectLst>
-              </a:rPr>
-            </a:br>
-            <a:r>
-              <a:rPr lang="en-US" sz="2800" b="1" dirty="0" smtClean="0">
-                <a:effectLst>
-                  <a:outerShdw blurRad="38100" dist="38100" dir="2700000" algn="tl">
-                    <a:srgbClr val="000000">
-                      <a:alpha val="43137"/>
-                    </a:srgbClr>
-                  </a:outerShdw>
-                </a:effectLst>
-              </a:rPr>
-              <a:t/>
-            </a:r>
-            <a:br>
-              <a:rPr lang="en-US" sz="2800" b="1" dirty="0" smtClean="0">
-                <a:effectLst>
-                  <a:outerShdw blurRad="38100" dist="38100" dir="2700000" algn="tl">
-                    <a:srgbClr val="000000">
-                      <a:alpha val="43137"/>
-                    </a:srgbClr>
-                  </a:outerShdw>
-                </a:effectLst>
-              </a:rPr>
-            </a:br>
-            <a:r>
-              <a:rPr lang="en-US" sz="2800" b="1" dirty="0">
-                <a:effectLst>
-                  <a:outerShdw blurRad="38100" dist="38100" dir="2700000" algn="tl">
-                    <a:srgbClr val="000000">
-                      <a:alpha val="43137"/>
-                    </a:srgbClr>
-                  </a:outerShdw>
-                </a:effectLst>
-              </a:rPr>
-              <a:t/>
             </a:r>
             <a:br>
               <a:rPr lang="en-US" sz="2800" b="1" dirty="0">
@@ -7022,54 +7122,8 @@
                 </a:effectLst>
               </a:rPr>
             </a:br>
-            <a:r>
-              <a:rPr lang="en-US" sz="2800" dirty="0" smtClean="0"/>
-              <a:t/>
-            </a:r>
             <a:br>
-              <a:rPr lang="en-US" sz="2800" dirty="0" smtClean="0"/>
-            </a:br>
-            <a:r>
-              <a:rPr lang="en-US" sz="2800" dirty="0"/>
-              <a:t/>
-            </a:r>
-            <a:br>
-              <a:rPr lang="en-US" sz="2800" dirty="0"/>
-            </a:br>
-            <a:r>
-              <a:rPr lang="en-US" sz="2800" dirty="0" smtClean="0"/>
-              <a:t/>
-            </a:r>
-            <a:br>
-              <a:rPr lang="en-US" sz="2800" dirty="0" smtClean="0"/>
-            </a:br>
-            <a:endParaRPr lang="en-US" sz="2800" dirty="0"/>
-          </a:p>
-        </p:txBody>
-      </p:sp>
-      <p:sp>
-        <p:nvSpPr>
-          <p:cNvPr id="3" name="Subtitle 2"/>
-          <p:cNvSpPr>
-            <a:spLocks noGrp="1"/>
-          </p:cNvSpPr>
-          <p:nvPr>
-            <p:ph type="subTitle" idx="1"/>
-          </p:nvPr>
-        </p:nvSpPr>
-        <p:spPr>
-          <a:xfrm>
-            <a:off x="1045029" y="2868805"/>
-            <a:ext cx="10071462" cy="2402057"/>
-          </a:xfrm>
-        </p:spPr>
-        <p:txBody>
-          <a:bodyPr/>
-          <a:lstStyle/>
-          <a:p>
-            <a:pPr algn="l"/>
-            <a:r>
-              <a:rPr lang="en-US" i="1" dirty="0" smtClean="0">
+              <a:rPr lang="en-US" sz="2800" b="1" dirty="0">
                 <a:effectLst>
                   <a:outerShdw blurRad="38100" dist="38100" dir="2700000" algn="tl">
                     <a:srgbClr val="000000">
@@ -7078,12 +7132,70 @@
                   </a:outerShdw>
                 </a:effectLst>
               </a:rPr>
-              <a:t>This game is written in Java. It has one hero – Rabbit, who must collects  as he</a:t>
-            </a:r>
-          </a:p>
+            </a:br>
+            <a:br>
+              <a:rPr lang="en-US" sz="2800" b="1" dirty="0">
+                <a:effectLst>
+                  <a:outerShdw blurRad="38100" dist="38100" dir="2700000" algn="tl">
+                    <a:srgbClr val="000000">
+                      <a:alpha val="43137"/>
+                    </a:srgbClr>
+                  </a:outerShdw>
+                </a:effectLst>
+              </a:rPr>
+            </a:br>
+            <a:br>
+              <a:rPr lang="en-US" sz="2800" dirty="0"/>
+            </a:br>
+            <a:br>
+              <a:rPr lang="en-US" sz="2800" dirty="0"/>
+            </a:br>
+            <a:br>
+              <a:rPr lang="en-US" sz="2800" dirty="0"/>
+            </a:br>
+            <a:endParaRPr lang="en-US" sz="2800" dirty="0"/>
+          </a:p>
+        </p:txBody>
+      </p:sp>
+      <p:sp>
+        <p:nvSpPr>
+          <p:cNvPr id="3" name="Subtitle 2"/>
+          <p:cNvSpPr>
+            <a:spLocks noGrp="1"/>
+          </p:cNvSpPr>
+          <p:nvPr>
+            <p:ph type="subTitle" idx="1"/>
+          </p:nvPr>
+        </p:nvSpPr>
+        <p:spPr>
+          <a:xfrm>
+            <a:off x="1748042" y="2289498"/>
+            <a:ext cx="9317877" cy="4196459"/>
+          </a:xfrm>
+        </p:spPr>
+        <p:txBody>
+          <a:bodyPr>
+            <a:normAutofit/>
+          </a:bodyPr>
+          <a:lstStyle/>
           <a:p>
             <a:pPr algn="l"/>
-            <a:endParaRPr lang="en-US" i="1" dirty="0" smtClean="0">
+            <a:r>
+              <a:rPr lang="en-US" sz="2000" i="1" dirty="0">
+                <a:effectLst>
+                  <a:outerShdw blurRad="38100" dist="38100" dir="2700000" algn="tl">
+                    <a:srgbClr val="000000">
+                      <a:alpha val="43137"/>
+                    </a:srgbClr>
+                  </a:outerShdw>
+                </a:effectLst>
+              </a:rPr>
+              <a:t>This game is written in Java. It has one hero – Rabbit, who</a:t>
+            </a:r>
+          </a:p>
+          <a:p>
+            <a:pPr algn="l"/>
+            <a:endParaRPr lang="en-US" sz="2000" i="1" dirty="0">
               <a:effectLst>
                 <a:outerShdw blurRad="38100" dist="38100" dir="2700000" algn="tl">
                   <a:srgbClr val="000000">
@@ -7096,7 +7208,7 @@
           <a:p>
             <a:pPr algn="l"/>
             <a:r>
-              <a:rPr lang="en-US" i="1" dirty="0" smtClean="0">
+              <a:rPr lang="en-US" sz="2000" i="1" dirty="0">
                 <a:effectLst>
                   <a:outerShdw blurRad="38100" dist="38100" dir="2700000" algn="tl">
                     <a:srgbClr val="000000">
@@ -7105,9 +7217,12 @@
                   </a:outerShdw>
                 </a:effectLst>
               </a:rPr>
-              <a:t> can eggs and chicks. Rabbit has to watch out for falling rocks.</a:t>
-            </a:r>
-            <a:endParaRPr lang="en-US" i="1" dirty="0">
+              <a:t> must collects as he can eggs and chicks. Rabbit has to watch</a:t>
+            </a:r>
+          </a:p>
+          <a:p>
+            <a:pPr algn="l"/>
+            <a:endParaRPr lang="en-US" sz="2000" i="1" dirty="0">
               <a:effectLst>
                 <a:outerShdw blurRad="38100" dist="38100" dir="2700000" algn="tl">
                   <a:srgbClr val="000000">
@@ -7115,6 +7230,147 @@
                   </a:srgbClr>
                 </a:outerShdw>
               </a:effectLst>
+            </a:endParaRPr>
+          </a:p>
+          <a:p>
+            <a:pPr algn="l"/>
+            <a:r>
+              <a:rPr lang="en-US" sz="2000" i="1" dirty="0">
+                <a:effectLst>
+                  <a:outerShdw blurRad="38100" dist="38100" dir="2700000" algn="tl">
+                    <a:srgbClr val="000000">
+                      <a:alpha val="43137"/>
+                    </a:srgbClr>
+                  </a:outerShdw>
+                </a:effectLst>
+              </a:rPr>
+              <a:t> out for falling rocks. </a:t>
+            </a:r>
+            <a:r>
+              <a:rPr lang="en-US" sz="2000" i="1" dirty="0">
+                <a:effectLst>
+                  <a:outerShdw blurRad="38100" dist="38100" dir="2700000" algn="tl">
+                    <a:srgbClr val="000000">
+                      <a:alpha val="43137"/>
+                    </a:srgbClr>
+                  </a:outerShdw>
+                </a:effectLst>
+                <a:latin typeface="Trebuchet MS" charset="0"/>
+              </a:rPr>
+              <a:t>To start the game does not need to do</a:t>
+            </a:r>
+          </a:p>
+          <a:p>
+            <a:pPr algn="l"/>
+            <a:endParaRPr lang="en-US" sz="2000" i="1" dirty="0">
+              <a:effectLst>
+                <a:outerShdw blurRad="38100" dist="38100" dir="2700000" algn="tl">
+                  <a:srgbClr val="000000">
+                    <a:alpha val="43137"/>
+                  </a:srgbClr>
+                </a:outerShdw>
+              </a:effectLst>
+              <a:latin typeface="Trebuchet MS" charset="0"/>
+            </a:endParaRPr>
+          </a:p>
+          <a:p>
+            <a:pPr algn="l"/>
+            <a:r>
+              <a:rPr lang="en-US" sz="2000" i="1" dirty="0">
+                <a:effectLst>
+                  <a:outerShdw blurRad="38100" dist="38100" dir="2700000" algn="tl">
+                    <a:srgbClr val="000000">
+                      <a:alpha val="43137"/>
+                    </a:srgbClr>
+                  </a:outerShdw>
+                </a:effectLst>
+                <a:latin typeface="Trebuchet MS" charset="0"/>
+              </a:rPr>
+              <a:t> anything except start the file</a:t>
+            </a:r>
+            <a:r>
+              <a:rPr lang="en-US" sz="2000" i="1" dirty="0">
+                <a:solidFill>
+                  <a:srgbClr val="6C911C"/>
+                </a:solidFill>
+                <a:effectLst>
+                  <a:outerShdw blurRad="38100" dist="38100" dir="2700000" algn="tl">
+                    <a:srgbClr val="000000">
+                      <a:alpha val="43137"/>
+                    </a:srgbClr>
+                  </a:outerShdw>
+                </a:effectLst>
+                <a:latin typeface="Trebuchet MS" charset="0"/>
+              </a:rPr>
+              <a:t> </a:t>
+            </a:r>
+            <a:r>
+              <a:rPr lang="en-US" sz="2000" i="1" dirty="0">
+                <a:solidFill>
+                  <a:srgbClr val="7F7F7F"/>
+                </a:solidFill>
+                <a:effectLst>
+                  <a:outerShdw blurRad="38100" dist="38100" dir="2700000" algn="tl">
+                    <a:srgbClr val="000000">
+                      <a:alpha val="43137"/>
+                    </a:srgbClr>
+                  </a:outerShdw>
+                </a:effectLst>
+                <a:latin typeface="Trebuchet MS" charset="0"/>
+              </a:rPr>
+              <a:t>FallingEggs.jar</a:t>
+            </a:r>
+            <a:r>
+              <a:rPr lang="en-US" sz="2000" i="1" dirty="0">
+                <a:effectLst>
+                  <a:outerShdw blurRad="38100" dist="38100" dir="2700000" algn="tl">
+                    <a:srgbClr val="000000">
+                      <a:alpha val="43137"/>
+                    </a:srgbClr>
+                  </a:outerShdw>
+                </a:effectLst>
+                <a:latin typeface="Trebuchet MS" charset="0"/>
+              </a:rPr>
+              <a:t> and press play</a:t>
+            </a:r>
+          </a:p>
+          <a:p>
+            <a:pPr algn="l"/>
+            <a:endParaRPr lang="en-US" sz="2000" i="1" dirty="0">
+              <a:effectLst>
+                <a:outerShdw blurRad="38100" dist="38100" dir="2700000" algn="tl">
+                  <a:srgbClr val="000000">
+                    <a:alpha val="43137"/>
+                  </a:srgbClr>
+                </a:outerShdw>
+              </a:effectLst>
+              <a:latin typeface="Trebuchet MS" charset="0"/>
+            </a:endParaRPr>
+          </a:p>
+          <a:p>
+            <a:pPr algn="l"/>
+            <a:r>
+              <a:rPr lang="en-US" sz="2000" i="1" dirty="0">
+                <a:effectLst>
+                  <a:outerShdw blurRad="38100" dist="38100" dir="2700000" algn="tl">
+                    <a:srgbClr val="000000">
+                      <a:alpha val="43137"/>
+                    </a:srgbClr>
+                  </a:outerShdw>
+                </a:effectLst>
+                <a:latin typeface="Trebuchet MS" charset="0"/>
+              </a:rPr>
+              <a:t> button. Have fun!</a:t>
+            </a:r>
+            <a:endParaRPr lang="bg-BG" sz="2000" i="1" dirty="0">
+              <a:effectLst>
+                <a:outerShdw blurRad="38100" dist="38100" dir="2700000" algn="tl">
+                  <a:srgbClr val="000000">
+                    <a:alpha val="43137"/>
+                  </a:srgbClr>
+                </a:outerShdw>
+              </a:effectLst>
+              <a:latin typeface="Trebuchet MS" charset="0"/>
             </a:endParaRPr>
           </a:p>
         </p:txBody>
@@ -7129,13 +7385,6 @@
   <p:clrMapOvr>
     <a:masterClrMapping/>
   </p:clrMapOvr>
-  <p:timing>
-    <p:tnLst>
-      <p:par>
-        <p:cTn id="1" dur="indefinite" restart="never" nodeType="tmRoot"/>
-      </p:par>
-    </p:tnLst>
-  </p:timing>
 </p:sld>
 </file>
 
@@ -7394,4 +7643,299 @@
     </a:ext>
   </a:extLst>
 </a:theme>
+</file>
+
+<file path=ppt/theme/theme2.xml><?xml version="1.0" encoding="utf-8"?>
+<a:theme xmlns:a="http://schemas.openxmlformats.org/drawingml/2006/main" name="Тема на Office">
+  <a:themeElements>
+    <a:clrScheme name="Оffice">
+      <a:dk1>
+        <a:sysClr val="windowText" lastClr="000000"/>
+      </a:dk1>
+      <a:lt1>
+        <a:sysClr val="window" lastClr="FFFFFF"/>
+      </a:lt1>
+      <a:dk2>
+        <a:srgbClr val="44546A"/>
+      </a:dk2>
+      <a:lt2>
+        <a:srgbClr val="E7E6E6"/>
+      </a:lt2>
+      <a:accent1>
+        <a:srgbClr val="5B9BD5"/>
+      </a:accent1>
+      <a:accent2>
+        <a:srgbClr val="ED7D31"/>
+      </a:accent2>
+      <a:accent3>
+        <a:srgbClr val="A5A5A5"/>
+      </a:accent3>
+      <a:accent4>
+        <a:srgbClr val="FFC000"/>
+      </a:accent4>
+      <a:accent5>
+        <a:srgbClr val="4472C4"/>
+      </a:accent5>
+      <a:accent6>
+        <a:srgbClr val="70AD47"/>
+      </a:accent6>
+      <a:hlink>
+        <a:srgbClr val="0563C1"/>
+      </a:hlink>
+      <a:folHlink>
+        <a:srgbClr val="954F72"/>
+      </a:folHlink>
+    </a:clrScheme>
+    <a:fontScheme name="Оffice">
+      <a:majorFont>
+        <a:latin typeface="Calibri Light" panose="020F0302020204030204"/>
+        <a:ea typeface=""/>
+        <a:cs typeface=""/>
+        <a:font script="Jpan" typeface="游ゴシック Light"/>
+        <a:font script="Hang" typeface="맑은 고딕"/>
+        <a:font script="Hans" typeface="等线 Light"/>
+        <a:font script="Hant" typeface="新細明體"/>
+        <a:font script="Arab" typeface="Times New Roman"/>
+        <a:font script="Hebr" typeface="Times New Roman"/>
+        <a:font script="Thai" typeface="Angsana New"/>
+        <a:font script="Ethi" typeface="Nyala"/>
+        <a:font script="Beng" typeface="Vrinda"/>
+        <a:font script="Gujr" typeface="Shruti"/>
+        <a:font script="Khmr" typeface="MoolBoran"/>
+        <a:font script="Knda" typeface="Tunga"/>
+        <a:font script="Guru" typeface="Raavi"/>
+        <a:font script="Cans" typeface="Euphemia"/>
+        <a:font script="Cher" typeface="Plantagenet Cherokee"/>
+        <a:font script="Yiii" typeface="Microsoft Yi Baiti"/>
+        <a:font script="Tibt" typeface="Microsoft Himalaya"/>
+        <a:font script="Thaa" typeface="MV Boli"/>
+        <a:font script="Deva" typeface="Mangal"/>
+        <a:font script="Telu" typeface="Gautami"/>
+        <a:font script="Taml" typeface="Latha"/>
+        <a:font script="Syrc" typeface="Estrangelo Edessa"/>
+        <a:font script="Orya" typeface="Kalinga"/>
+        <a:font script="Mlym" typeface="Kartika"/>
+        <a:font script="Laoo" typeface="DokChampa"/>
+        <a:font script="Sinh" typeface="Iskoola Pota"/>
+        <a:font script="Mong" typeface="Mongolian Baiti"/>
+        <a:font script="Viet" typeface="Times New Roman"/>
+        <a:font script="Uigh" typeface="Microsoft Uighur"/>
+        <a:font script="Geor" typeface="Sylfaen"/>
+        <a:font script="Armn" typeface="Arial"/>
+        <a:font script="Bugi" typeface="Leelawadee UI"/>
+        <a:font script="Bopo" typeface="Microsoft JhengHei"/>
+        <a:font script="Java" typeface="Javanese Text"/>
+        <a:font script="Lisu" typeface="Segoe UI"/>
+        <a:font script="Mymr" typeface="Myanmar Text"/>
+        <a:font script="Nkoo" typeface="Ebrima"/>
+        <a:font script="Olck" typeface="Nirmala UI"/>
+        <a:font script="Osma" typeface="Ebrima"/>
+        <a:font script="Phag" typeface="Phagspa"/>
+        <a:font script="Syrn" typeface="Estrangelo Edessa"/>
+        <a:font script="Syrj" typeface="Estrangelo Edessa"/>
+        <a:font script="Syre" typeface="Estrangelo Edessa"/>
+        <a:font script="Sora" typeface="Nirmala UI"/>
+        <a:font script="Tale" typeface="Microsoft Tai Le"/>
+        <a:font script="Talu" typeface="Microsoft New Tai Lue"/>
+        <a:font script="Tfng" typeface="Ebrima"/>
+      </a:majorFont>
+      <a:minorFont>
+        <a:latin typeface="Calibri" panose="020F0502020204030204"/>
+        <a:ea typeface=""/>
+        <a:cs typeface=""/>
+        <a:font script="Jpan" typeface="游ゴシック"/>
+        <a:font script="Hang" typeface="맑은 고딕"/>
+        <a:font script="Hans" typeface="等线"/>
+        <a:font script="Hant" typeface="新細明體"/>
+        <a:font script="Arab" typeface="Arial"/>
+        <a:font script="Hebr" typeface="Arial"/>
+        <a:font script="Thai" typeface="Cordia New"/>
+        <a:font script="Ethi" typeface="Nyala"/>
+        <a:font script="Beng" typeface="Vrinda"/>
+        <a:font script="Gujr" typeface="Shruti"/>
+        <a:font script="Khmr" typeface="DaunPenh"/>
+        <a:font script="Knda" typeface="Tunga"/>
+        <a:font script="Guru" typeface="Raavi"/>
+        <a:font script="Cans" typeface="Euphemia"/>
+        <a:font script="Cher" typeface="Plantagenet Cherokee"/>
+        <a:font script="Yiii" typeface="Microsoft Yi Baiti"/>
+        <a:font script="Tibt" typeface="Microsoft Himalaya"/>
+        <a:font script="Thaa" typeface="MV Boli"/>
+        <a:font script="Deva" typeface="Mangal"/>
+        <a:font script="Telu" typeface="Gautami"/>
+        <a:font script="Taml" typeface="Latha"/>
+        <a:font script="Syrc" typeface="Estrangelo Edessa"/>
+        <a:font script="Orya" typeface="Kalinga"/>
+        <a:font script="Mlym" typeface="Kartika"/>
+        <a:font script="Laoo" typeface="DokChampa"/>
+        <a:font script="Sinh" typeface="Iskoola Pota"/>
+        <a:font script="Mong" typeface="Mongolian Baiti"/>
+        <a:font script="Viet" typeface="Arial"/>
+        <a:font script="Uigh" typeface="Microsoft Uighur"/>
+        <a:font script="Geor" typeface="Sylfaen"/>
+        <a:font script="Armn" typeface="Arial"/>
+        <a:font script="Bugi" typeface="Leelawadee UI"/>
+        <a:font script="Bopo" typeface="Microsoft JhengHei"/>
+        <a:font script="Java" typeface="Javanese Text"/>
+        <a:font script="Lisu" typeface="Segoe UI"/>
+        <a:font script="Mymr" typeface="Myanmar Text"/>
+        <a:font script="Nkoo" typeface="Ebrima"/>
+        <a:font script="Olck" typeface="Nirmala UI"/>
+        <a:font script="Osma" typeface="Ebrima"/>
+        <a:font script="Phag" typeface="Phagspa"/>
+        <a:font script="Syrn" typeface="Estrangelo Edessa"/>
+        <a:font script="Syrj" typeface="Estrangelo Edessa"/>
+        <a:font script="Syre" typeface="Estrangelo Edessa"/>
+        <a:font script="Sora" typeface="Nirmala UI"/>
+        <a:font script="Tale" typeface="Microsoft Tai Le"/>
+        <a:font script="Talu" typeface="Microsoft New Tai Lue"/>
+        <a:font script="Tfng" typeface="Ebrima"/>
+      </a:minorFont>
+    </a:fontScheme>
+    <a:fmtScheme name="Оffice">
+      <a:fillStyleLst>
+        <a:solidFill>
+          <a:schemeClr val="phClr"/>
+        </a:solidFill>
+        <a:gradFill rotWithShape="1">
+          <a:gsLst>
+            <a:gs pos="0">
+              <a:schemeClr val="phClr">
+                <a:lumMod val="110000"/>
+                <a:satMod val="105000"/>
+                <a:tint val="67000"/>
+              </a:schemeClr>
+            </a:gs>
+            <a:gs pos="50000">
+              <a:schemeClr val="phClr">
+                <a:lumMod val="105000"/>
+                <a:satMod val="103000"/>
+                <a:tint val="73000"/>
+              </a:schemeClr>
+            </a:gs>
+            <a:gs pos="100000">
+              <a:schemeClr val="phClr">
+                <a:lumMod val="105000"/>
+                <a:satMod val="109000"/>
+                <a:tint val="81000"/>
+              </a:schemeClr>
+            </a:gs>
+          </a:gsLst>
+          <a:lin ang="5400000" scaled="0"/>
+        </a:gradFill>
+        <a:gradFill rotWithShape="1">
+          <a:gsLst>
+            <a:gs pos="0">
+              <a:schemeClr val="phClr">
+                <a:satMod val="103000"/>
+                <a:lumMod val="102000"/>
+                <a:tint val="94000"/>
+              </a:schemeClr>
+            </a:gs>
+            <a:gs pos="50000">
+              <a:schemeClr val="phClr">
+                <a:satMod val="110000"/>
+                <a:lumMod val="100000"/>
+                <a:shade val="100000"/>
+              </a:schemeClr>
+            </a:gs>
+            <a:gs pos="100000">
+              <a:schemeClr val="phClr">
+                <a:lumMod val="99000"/>
+                <a:satMod val="120000"/>
+                <a:shade val="78000"/>
+              </a:schemeClr>
+            </a:gs>
+          </a:gsLst>
+          <a:lin ang="5400000" scaled="0"/>
+        </a:gradFill>
+      </a:fillStyleLst>
+      <a:lnStyleLst>
+        <a:ln w="6350" cap="flat" cmpd="sng" algn="ctr">
+          <a:solidFill>
+            <a:schemeClr val="phClr"/>
+          </a:solidFill>
+          <a:prstDash val="solid"/>
+          <a:miter lim="800000"/>
+        </a:ln>
+        <a:ln w="12700" cap="flat" cmpd="sng" algn="ctr">
+          <a:solidFill>
+            <a:schemeClr val="phClr"/>
+          </a:solidFill>
+          <a:prstDash val="solid"/>
+          <a:miter lim="800000"/>
+        </a:ln>
+        <a:ln w="19050" cap="flat" cmpd="sng" algn="ctr">
+          <a:solidFill>
+            <a:schemeClr val="phClr"/>
+          </a:solidFill>
+          <a:prstDash val="solid"/>
+          <a:miter lim="800000"/>
+        </a:ln>
+      </a:lnStyleLst>
+      <a:effectStyleLst>
+        <a:effectStyle>
+          <a:effectLst/>
+        </a:effectStyle>
+        <a:effectStyle>
+          <a:effectLst/>
+        </a:effectStyle>
+        <a:effectStyle>
+          <a:effectLst>
+            <a:outerShdw blurRad="57150" dist="19050" dir="5400000" algn="ctr" rotWithShape="0">
+              <a:srgbClr val="000000">
+                <a:alpha val="63000"/>
+              </a:srgbClr>
+            </a:outerShdw>
+          </a:effectLst>
+        </a:effectStyle>
+      </a:effectStyleLst>
+      <a:bgFillStyleLst>
+        <a:solidFill>
+          <a:schemeClr val="phClr"/>
+        </a:solidFill>
+        <a:solidFill>
+          <a:schemeClr val="phClr">
+            <a:tint val="95000"/>
+            <a:satMod val="170000"/>
+          </a:schemeClr>
+        </a:solidFill>
+        <a:gradFill rotWithShape="1">
+          <a:gsLst>
+            <a:gs pos="0">
+              <a:schemeClr val="phClr">
+                <a:tint val="93000"/>
+                <a:satMod val="150000"/>
+                <a:shade val="98000"/>
+                <a:lumMod val="102000"/>
+              </a:schemeClr>
+            </a:gs>
+            <a:gs pos="50000">
+              <a:schemeClr val="phClr">
+                <a:tint val="98000"/>
+                <a:satMod val="130000"/>
+                <a:shade val="90000"/>
+                <a:lumMod val="103000"/>
+              </a:schemeClr>
+            </a:gs>
+            <a:gs pos="100000">
+              <a:schemeClr val="phClr">
+                <a:shade val="63000"/>
+                <a:satMod val="120000"/>
+              </a:schemeClr>
+            </a:gs>
+          </a:gsLst>
+          <a:lin ang="5400000" scaled="0"/>
+        </a:gradFill>
+      </a:bgFillStyleLst>
+    </a:fmtScheme>
+  </a:themeElements>
+  <a:objectDefaults/>
+  <a:extraClrSchemeLst/>
+  <a:extLst>
+    <a:ext uri="{05A4C25C-085E-4340-85A3-A5531E510DB2}">
+      <thm15:themeFamily xmlns:thm15="http://schemas.microsoft.com/office/thememl/2012/main" name="Office Theme" id="{62F939B6-93AF-4DB8-9C6B-D6C7DFDC589F}" vid="{4A3C46E8-61CC-4603-A589-7422A47A8E4A}"/>
+    </a:ext>
+  </a:extLst>
+</a:theme>
 </file>
</xml_diff>